<commit_message>
Session 01 - Slide update
</commit_message>
<xml_diff>
--- a/slides/img/session-01/graphics.pptx
+++ b/slides/img/session-01/graphics.pptx
@@ -5,10 +5,11 @@
     <p:sldMasterId id="2147483660" r:id="rId1"/>
   </p:sldMasterIdLst>
   <p:sldIdLst>
-    <p:sldId id="258" r:id="rId2"/>
-    <p:sldId id="259" r:id="rId3"/>
-    <p:sldId id="260" r:id="rId4"/>
-    <p:sldId id="261" r:id="rId5"/>
+    <p:sldId id="262" r:id="rId2"/>
+    <p:sldId id="258" r:id="rId3"/>
+    <p:sldId id="259" r:id="rId4"/>
+    <p:sldId id="260" r:id="rId5"/>
+    <p:sldId id="261" r:id="rId6"/>
   </p:sldIdLst>
   <p:sldSz cx="9144000" cy="6858000" type="screen4x3"/>
   <p:notesSz cx="6858000" cy="9144000"/>
@@ -246,7 +247,7 @@
           <a:p>
             <a:fld id="{D4AD81DB-2089-4255-B6DA-736AFDF018C6}" type="datetimeFigureOut">
               <a:rPr lang="de-DE" smtClean="0"/>
-              <a:t>20.10.23</a:t>
+              <a:t>22.10.23</a:t>
             </a:fld>
             <a:endParaRPr lang="de-DE"/>
           </a:p>
@@ -416,7 +417,7 @@
           <a:p>
             <a:fld id="{D4AD81DB-2089-4255-B6DA-736AFDF018C6}" type="datetimeFigureOut">
               <a:rPr lang="de-DE" smtClean="0"/>
-              <a:t>20.10.23</a:t>
+              <a:t>22.10.23</a:t>
             </a:fld>
             <a:endParaRPr lang="de-DE"/>
           </a:p>
@@ -596,7 +597,7 @@
           <a:p>
             <a:fld id="{D4AD81DB-2089-4255-B6DA-736AFDF018C6}" type="datetimeFigureOut">
               <a:rPr lang="de-DE" smtClean="0"/>
-              <a:t>20.10.23</a:t>
+              <a:t>22.10.23</a:t>
             </a:fld>
             <a:endParaRPr lang="de-DE"/>
           </a:p>
@@ -766,7 +767,7 @@
           <a:p>
             <a:fld id="{D4AD81DB-2089-4255-B6DA-736AFDF018C6}" type="datetimeFigureOut">
               <a:rPr lang="de-DE" smtClean="0"/>
-              <a:t>20.10.23</a:t>
+              <a:t>22.10.23</a:t>
             </a:fld>
             <a:endParaRPr lang="de-DE"/>
           </a:p>
@@ -1010,7 +1011,7 @@
           <a:p>
             <a:fld id="{D4AD81DB-2089-4255-B6DA-736AFDF018C6}" type="datetimeFigureOut">
               <a:rPr lang="de-DE" smtClean="0"/>
-              <a:t>20.10.23</a:t>
+              <a:t>22.10.23</a:t>
             </a:fld>
             <a:endParaRPr lang="de-DE"/>
           </a:p>
@@ -1242,7 +1243,7 @@
           <a:p>
             <a:fld id="{D4AD81DB-2089-4255-B6DA-736AFDF018C6}" type="datetimeFigureOut">
               <a:rPr lang="de-DE" smtClean="0"/>
-              <a:t>20.10.23</a:t>
+              <a:t>22.10.23</a:t>
             </a:fld>
             <a:endParaRPr lang="de-DE"/>
           </a:p>
@@ -1609,7 +1610,7 @@
           <a:p>
             <a:fld id="{D4AD81DB-2089-4255-B6DA-736AFDF018C6}" type="datetimeFigureOut">
               <a:rPr lang="de-DE" smtClean="0"/>
-              <a:t>20.10.23</a:t>
+              <a:t>22.10.23</a:t>
             </a:fld>
             <a:endParaRPr lang="de-DE"/>
           </a:p>
@@ -1727,7 +1728,7 @@
           <a:p>
             <a:fld id="{D4AD81DB-2089-4255-B6DA-736AFDF018C6}" type="datetimeFigureOut">
               <a:rPr lang="de-DE" smtClean="0"/>
-              <a:t>20.10.23</a:t>
+              <a:t>22.10.23</a:t>
             </a:fld>
             <a:endParaRPr lang="de-DE"/>
           </a:p>
@@ -1822,7 +1823,7 @@
           <a:p>
             <a:fld id="{D4AD81DB-2089-4255-B6DA-736AFDF018C6}" type="datetimeFigureOut">
               <a:rPr lang="de-DE" smtClean="0"/>
-              <a:t>20.10.23</a:t>
+              <a:t>22.10.23</a:t>
             </a:fld>
             <a:endParaRPr lang="de-DE"/>
           </a:p>
@@ -2099,7 +2100,7 @@
           <a:p>
             <a:fld id="{D4AD81DB-2089-4255-B6DA-736AFDF018C6}" type="datetimeFigureOut">
               <a:rPr lang="de-DE" smtClean="0"/>
-              <a:t>20.10.23</a:t>
+              <a:t>22.10.23</a:t>
             </a:fld>
             <a:endParaRPr lang="de-DE"/>
           </a:p>
@@ -2356,7 +2357,7 @@
           <a:p>
             <a:fld id="{D4AD81DB-2089-4255-B6DA-736AFDF018C6}" type="datetimeFigureOut">
               <a:rPr lang="de-DE" smtClean="0"/>
-              <a:t>20.10.23</a:t>
+              <a:t>22.10.23</a:t>
             </a:fld>
             <a:endParaRPr lang="de-DE"/>
           </a:p>
@@ -2569,7 +2570,7 @@
           <a:p>
             <a:fld id="{D4AD81DB-2089-4255-B6DA-736AFDF018C6}" type="datetimeFigureOut">
               <a:rPr lang="de-DE" smtClean="0"/>
-              <a:t>20.10.23</a:t>
+              <a:t>22.10.23</a:t>
             </a:fld>
             <a:endParaRPr lang="de-DE"/>
           </a:p>
@@ -2974,907 +2975,618 @@
           <a:chExt cx="0" cy="0"/>
         </a:xfrm>
       </p:grpSpPr>
-      <p:pic>
-        <p:nvPicPr>
-          <p:cNvPr id="3" name="Graphic 2" descr="Taxi with solid fill">
-            <a:extLst>
-              <a:ext uri="{FF2B5EF4-FFF2-40B4-BE49-F238E27FC236}">
-                <a16:creationId xmlns:a16="http://schemas.microsoft.com/office/drawing/2014/main" id="{573C5B3C-1712-3B2C-9599-94DD97AB93A8}"/>
-              </a:ext>
-            </a:extLst>
-          </p:cNvPr>
-          <p:cNvPicPr>
-            <a:picLocks noChangeAspect="1"/>
-          </p:cNvPicPr>
-          <p:nvPr/>
-        </p:nvPicPr>
-        <p:blipFill>
-          <a:blip r:embed="rId2">
-            <a:extLst>
-              <a:ext uri="{28A0092B-C50C-407E-A947-70E740481C1C}">
-                <a14:useLocalDpi xmlns:a14="http://schemas.microsoft.com/office/drawing/2010/main" val="0"/>
-              </a:ext>
-              <a:ext uri="{96DAC541-7B7A-43D3-8B79-37D633B846F1}">
-                <asvg:svgBlip xmlns:asvg="http://schemas.microsoft.com/office/drawing/2016/SVG/main" r:embed="rId3"/>
-              </a:ext>
-            </a:extLst>
-          </a:blip>
-          <a:stretch>
-            <a:fillRect/>
-          </a:stretch>
-        </p:blipFill>
-        <p:spPr>
-          <a:xfrm>
-            <a:off x="2730714" y="906959"/>
-            <a:ext cx="1260000" cy="1260000"/>
-          </a:xfrm>
-          <a:prstGeom prst="rect">
-            <a:avLst/>
-          </a:prstGeom>
-        </p:spPr>
-      </p:pic>
-      <p:pic>
-        <p:nvPicPr>
-          <p:cNvPr id="5" name="Graphic 4" descr="Security camera with solid fill">
-            <a:extLst>
-              <a:ext uri="{FF2B5EF4-FFF2-40B4-BE49-F238E27FC236}">
-                <a16:creationId xmlns:a16="http://schemas.microsoft.com/office/drawing/2014/main" id="{2849CDCE-BE2F-DC1B-CE05-1AB0CA587B01}"/>
-              </a:ext>
-            </a:extLst>
-          </p:cNvPr>
-          <p:cNvPicPr>
-            <a:picLocks noChangeAspect="1"/>
-          </p:cNvPicPr>
-          <p:nvPr/>
-        </p:nvPicPr>
-        <p:blipFill>
-          <a:blip r:embed="rId4">
-            <a:extLst>
-              <a:ext uri="{28A0092B-C50C-407E-A947-70E740481C1C}">
-                <a14:useLocalDpi xmlns:a14="http://schemas.microsoft.com/office/drawing/2010/main" val="0"/>
-              </a:ext>
-              <a:ext uri="{96DAC541-7B7A-43D3-8B79-37D633B846F1}">
-                <asvg:svgBlip xmlns:asvg="http://schemas.microsoft.com/office/drawing/2016/SVG/main" r:embed="rId5"/>
-              </a:ext>
-            </a:extLst>
-          </a:blip>
-          <a:stretch>
-            <a:fillRect/>
-          </a:stretch>
-        </p:blipFill>
-        <p:spPr>
-          <a:xfrm>
-            <a:off x="1054859" y="174319"/>
-            <a:ext cx="1260000" cy="1260000"/>
-          </a:xfrm>
-          <a:prstGeom prst="rect">
-            <a:avLst/>
-          </a:prstGeom>
-        </p:spPr>
-      </p:pic>
-      <p:pic>
-        <p:nvPicPr>
-          <p:cNvPr id="7" name="Graphic 6" descr="Web cam with solid fill">
-            <a:extLst>
-              <a:ext uri="{FF2B5EF4-FFF2-40B4-BE49-F238E27FC236}">
-                <a16:creationId xmlns:a16="http://schemas.microsoft.com/office/drawing/2014/main" id="{5A5F3F7A-367E-30E8-9F96-569A14809476}"/>
-              </a:ext>
-            </a:extLst>
-          </p:cNvPr>
-          <p:cNvPicPr>
-            <a:picLocks noChangeAspect="1"/>
-          </p:cNvPicPr>
-          <p:nvPr/>
-        </p:nvPicPr>
-        <p:blipFill>
-          <a:blip r:embed="rId6">
-            <a:extLst>
-              <a:ext uri="{28A0092B-C50C-407E-A947-70E740481C1C}">
-                <a14:useLocalDpi xmlns:a14="http://schemas.microsoft.com/office/drawing/2010/main" val="0"/>
-              </a:ext>
-              <a:ext uri="{96DAC541-7B7A-43D3-8B79-37D633B846F1}">
-                <asvg:svgBlip xmlns:asvg="http://schemas.microsoft.com/office/drawing/2016/SVG/main" r:embed="rId7"/>
-              </a:ext>
-            </a:extLst>
-          </a:blip>
-          <a:stretch>
-            <a:fillRect/>
-          </a:stretch>
-        </p:blipFill>
-        <p:spPr>
-          <a:xfrm>
-            <a:off x="2662812" y="3980487"/>
-            <a:ext cx="1260000" cy="1260000"/>
-          </a:xfrm>
-          <a:prstGeom prst="rect">
-            <a:avLst/>
-          </a:prstGeom>
-        </p:spPr>
-      </p:pic>
-      <p:pic>
-        <p:nvPicPr>
-          <p:cNvPr id="9" name="Graphic 8" descr="Camera with solid fill">
-            <a:extLst>
-              <a:ext uri="{FF2B5EF4-FFF2-40B4-BE49-F238E27FC236}">
-                <a16:creationId xmlns:a16="http://schemas.microsoft.com/office/drawing/2014/main" id="{F2BE0CF7-FCEF-7FCA-9EBB-F4B293A351DA}"/>
-              </a:ext>
-            </a:extLst>
-          </p:cNvPr>
-          <p:cNvPicPr>
-            <a:picLocks noChangeAspect="1"/>
-          </p:cNvPicPr>
-          <p:nvPr/>
-        </p:nvPicPr>
-        <p:blipFill>
-          <a:blip r:embed="rId8">
-            <a:extLst>
-              <a:ext uri="{28A0092B-C50C-407E-A947-70E740481C1C}">
-                <a14:useLocalDpi xmlns:a14="http://schemas.microsoft.com/office/drawing/2010/main" val="0"/>
-              </a:ext>
-              <a:ext uri="{96DAC541-7B7A-43D3-8B79-37D633B846F1}">
-                <asvg:svgBlip xmlns:asvg="http://schemas.microsoft.com/office/drawing/2016/SVG/main" r:embed="rId9"/>
-              </a:ext>
-            </a:extLst>
-          </a:blip>
-          <a:stretch>
-            <a:fillRect/>
-          </a:stretch>
-        </p:blipFill>
-        <p:spPr>
-          <a:xfrm>
-            <a:off x="4237261" y="593020"/>
-            <a:ext cx="1260000" cy="1260000"/>
-          </a:xfrm>
-          <a:prstGeom prst="rect">
-            <a:avLst/>
-          </a:prstGeom>
-        </p:spPr>
-      </p:pic>
-      <p:pic>
-        <p:nvPicPr>
-          <p:cNvPr id="11" name="Graphic 10" descr="Smart Phone with solid fill">
-            <a:extLst>
-              <a:ext uri="{FF2B5EF4-FFF2-40B4-BE49-F238E27FC236}">
-                <a16:creationId xmlns:a16="http://schemas.microsoft.com/office/drawing/2014/main" id="{B213133E-D1CD-2EB8-AC42-FBE1733FD57B}"/>
-              </a:ext>
-            </a:extLst>
-          </p:cNvPr>
-          <p:cNvPicPr>
-            <a:picLocks noChangeAspect="1"/>
-          </p:cNvPicPr>
-          <p:nvPr/>
-        </p:nvPicPr>
-        <p:blipFill>
-          <a:blip r:embed="rId10">
-            <a:extLst>
-              <a:ext uri="{28A0092B-C50C-407E-A947-70E740481C1C}">
-                <a14:useLocalDpi xmlns:a14="http://schemas.microsoft.com/office/drawing/2010/main" val="0"/>
-              </a:ext>
-              <a:ext uri="{96DAC541-7B7A-43D3-8B79-37D633B846F1}">
-                <asvg:svgBlip xmlns:asvg="http://schemas.microsoft.com/office/drawing/2016/SVG/main" r:embed="rId11"/>
-              </a:ext>
-            </a:extLst>
-          </a:blip>
-          <a:stretch>
-            <a:fillRect/>
-          </a:stretch>
-        </p:blipFill>
-        <p:spPr>
-          <a:xfrm>
-            <a:off x="3556155" y="2988955"/>
-            <a:ext cx="1260000" cy="1260000"/>
-          </a:xfrm>
-          <a:prstGeom prst="rect">
-            <a:avLst/>
-          </a:prstGeom>
-        </p:spPr>
-      </p:pic>
-      <p:pic>
-        <p:nvPicPr>
-          <p:cNvPr id="13" name="Graphic 12" descr="Telephone with solid fill">
-            <a:extLst>
-              <a:ext uri="{FF2B5EF4-FFF2-40B4-BE49-F238E27FC236}">
-                <a16:creationId xmlns:a16="http://schemas.microsoft.com/office/drawing/2014/main" id="{258FBB28-F2A5-F984-C258-5AFF718EFE80}"/>
-              </a:ext>
-            </a:extLst>
-          </p:cNvPr>
-          <p:cNvPicPr>
-            <a:picLocks noChangeAspect="1"/>
-          </p:cNvPicPr>
-          <p:nvPr/>
-        </p:nvPicPr>
-        <p:blipFill>
-          <a:blip r:embed="rId12">
-            <a:extLst>
-              <a:ext uri="{28A0092B-C50C-407E-A947-70E740481C1C}">
-                <a14:useLocalDpi xmlns:a14="http://schemas.microsoft.com/office/drawing/2010/main" val="0"/>
-              </a:ext>
-              <a:ext uri="{96DAC541-7B7A-43D3-8B79-37D633B846F1}">
-                <asvg:svgBlip xmlns:asvg="http://schemas.microsoft.com/office/drawing/2016/SVG/main" r:embed="rId13"/>
-              </a:ext>
-            </a:extLst>
-          </a:blip>
-          <a:stretch>
-            <a:fillRect/>
-          </a:stretch>
-        </p:blipFill>
-        <p:spPr>
-          <a:xfrm>
-            <a:off x="5032120" y="5173591"/>
-            <a:ext cx="1260000" cy="1260000"/>
-          </a:xfrm>
-          <a:prstGeom prst="rect">
-            <a:avLst/>
-          </a:prstGeom>
-        </p:spPr>
-      </p:pic>
-      <p:pic>
-        <p:nvPicPr>
-          <p:cNvPr id="15" name="Graphic 14" descr="Game controller with solid fill">
-            <a:extLst>
-              <a:ext uri="{FF2B5EF4-FFF2-40B4-BE49-F238E27FC236}">
-                <a16:creationId xmlns:a16="http://schemas.microsoft.com/office/drawing/2014/main" id="{1C628A3E-1BFC-2B70-9DBE-61828CC350E9}"/>
-              </a:ext>
-            </a:extLst>
-          </p:cNvPr>
-          <p:cNvPicPr>
-            <a:picLocks noChangeAspect="1"/>
-          </p:cNvPicPr>
-          <p:nvPr/>
-        </p:nvPicPr>
-        <p:blipFill>
-          <a:blip r:embed="rId14">
-            <a:extLst>
-              <a:ext uri="{28A0092B-C50C-407E-A947-70E740481C1C}">
-                <a14:useLocalDpi xmlns:a14="http://schemas.microsoft.com/office/drawing/2010/main" val="0"/>
-              </a:ext>
-              <a:ext uri="{96DAC541-7B7A-43D3-8B79-37D633B846F1}">
-                <asvg:svgBlip xmlns:asvg="http://schemas.microsoft.com/office/drawing/2016/SVG/main" r:embed="rId15"/>
-              </a:ext>
-            </a:extLst>
-          </a:blip>
-          <a:stretch>
-            <a:fillRect/>
-          </a:stretch>
-        </p:blipFill>
-        <p:spPr>
-          <a:xfrm>
-            <a:off x="5282952" y="2754402"/>
-            <a:ext cx="1260000" cy="1260000"/>
-          </a:xfrm>
-          <a:prstGeom prst="rect">
-            <a:avLst/>
-          </a:prstGeom>
-        </p:spPr>
-      </p:pic>
-      <p:pic>
-        <p:nvPicPr>
-          <p:cNvPr id="17" name="Graphic 16" descr="Link with solid fill">
-            <a:extLst>
-              <a:ext uri="{FF2B5EF4-FFF2-40B4-BE49-F238E27FC236}">
-                <a16:creationId xmlns:a16="http://schemas.microsoft.com/office/drawing/2014/main" id="{D5372D78-A4D6-B8CD-7EE0-DCEDEF32E6D6}"/>
-              </a:ext>
-            </a:extLst>
-          </p:cNvPr>
-          <p:cNvPicPr>
-            <a:picLocks noChangeAspect="1"/>
-          </p:cNvPicPr>
-          <p:nvPr/>
-        </p:nvPicPr>
-        <p:blipFill>
-          <a:blip r:embed="rId16">
-            <a:extLst>
-              <a:ext uri="{28A0092B-C50C-407E-A947-70E740481C1C}">
-                <a14:useLocalDpi xmlns:a14="http://schemas.microsoft.com/office/drawing/2010/main" val="0"/>
-              </a:ext>
-              <a:ext uri="{96DAC541-7B7A-43D3-8B79-37D633B846F1}">
-                <asvg:svgBlip xmlns:asvg="http://schemas.microsoft.com/office/drawing/2016/SVG/main" r:embed="rId17"/>
-              </a:ext>
-            </a:extLst>
-          </a:blip>
-          <a:stretch>
-            <a:fillRect/>
-          </a:stretch>
-        </p:blipFill>
-        <p:spPr>
-          <a:xfrm>
-            <a:off x="4293108" y="1825431"/>
-            <a:ext cx="1260000" cy="1260000"/>
-          </a:xfrm>
-          <a:prstGeom prst="rect">
-            <a:avLst/>
-          </a:prstGeom>
-        </p:spPr>
-      </p:pic>
-      <p:pic>
-        <p:nvPicPr>
-          <p:cNvPr id="21" name="Graphic 20" descr="Map with pin with solid fill">
-            <a:extLst>
-              <a:ext uri="{FF2B5EF4-FFF2-40B4-BE49-F238E27FC236}">
-                <a16:creationId xmlns:a16="http://schemas.microsoft.com/office/drawing/2014/main" id="{75C00FAE-B6BE-F219-1310-BAF5681BBEF8}"/>
-              </a:ext>
-            </a:extLst>
-          </p:cNvPr>
-          <p:cNvPicPr>
-            <a:picLocks noChangeAspect="1"/>
-          </p:cNvPicPr>
-          <p:nvPr/>
-        </p:nvPicPr>
-        <p:blipFill>
-          <a:blip r:embed="rId18">
-            <a:extLst>
-              <a:ext uri="{28A0092B-C50C-407E-A947-70E740481C1C}">
-                <a14:useLocalDpi xmlns:a14="http://schemas.microsoft.com/office/drawing/2010/main" val="0"/>
-              </a:ext>
-              <a:ext uri="{96DAC541-7B7A-43D3-8B79-37D633B846F1}">
-                <asvg:svgBlip xmlns:asvg="http://schemas.microsoft.com/office/drawing/2016/SVG/main" r:embed="rId19"/>
-              </a:ext>
-            </a:extLst>
-          </a:blip>
-          <a:stretch>
-            <a:fillRect/>
-          </a:stretch>
-        </p:blipFill>
-        <p:spPr>
-          <a:xfrm>
-            <a:off x="1684859" y="5334482"/>
-            <a:ext cx="1260000" cy="1260000"/>
-          </a:xfrm>
-          <a:prstGeom prst="rect">
-            <a:avLst/>
-          </a:prstGeom>
-        </p:spPr>
-      </p:pic>
-      <p:pic>
-        <p:nvPicPr>
-          <p:cNvPr id="23" name="Graphic 22" descr="Compass with solid fill">
-            <a:extLst>
-              <a:ext uri="{FF2B5EF4-FFF2-40B4-BE49-F238E27FC236}">
-                <a16:creationId xmlns:a16="http://schemas.microsoft.com/office/drawing/2014/main" id="{34E280A9-C3D4-D96E-C779-33FD44ED28D7}"/>
-              </a:ext>
-            </a:extLst>
-          </p:cNvPr>
-          <p:cNvPicPr>
-            <a:picLocks noChangeAspect="1"/>
-          </p:cNvPicPr>
-          <p:nvPr/>
-        </p:nvPicPr>
-        <p:blipFill>
-          <a:blip r:embed="rId20">
-            <a:extLst>
-              <a:ext uri="{28A0092B-C50C-407E-A947-70E740481C1C}">
-                <a14:useLocalDpi xmlns:a14="http://schemas.microsoft.com/office/drawing/2010/main" val="0"/>
-              </a:ext>
-              <a:ext uri="{96DAC541-7B7A-43D3-8B79-37D633B846F1}">
-                <asvg:svgBlip xmlns:asvg="http://schemas.microsoft.com/office/drawing/2016/SVG/main" r:embed="rId21"/>
-              </a:ext>
-            </a:extLst>
-          </a:blip>
-          <a:stretch>
-            <a:fillRect/>
-          </a:stretch>
-        </p:blipFill>
-        <p:spPr>
-          <a:xfrm>
-            <a:off x="5740546" y="408872"/>
-            <a:ext cx="1260000" cy="1260000"/>
-          </a:xfrm>
-          <a:prstGeom prst="rect">
-            <a:avLst/>
-          </a:prstGeom>
-        </p:spPr>
-      </p:pic>
-      <p:pic>
-        <p:nvPicPr>
-          <p:cNvPr id="27" name="Graphic 26" descr="Watch with solid fill">
-            <a:extLst>
-              <a:ext uri="{FF2B5EF4-FFF2-40B4-BE49-F238E27FC236}">
-                <a16:creationId xmlns:a16="http://schemas.microsoft.com/office/drawing/2014/main" id="{F52080E1-A8B5-0E23-8144-C2965F58581F}"/>
-              </a:ext>
-            </a:extLst>
-          </p:cNvPr>
-          <p:cNvPicPr>
-            <a:picLocks noChangeAspect="1"/>
-          </p:cNvPicPr>
-          <p:nvPr/>
-        </p:nvPicPr>
-        <p:blipFill>
-          <a:blip r:embed="rId22">
-            <a:extLst>
-              <a:ext uri="{28A0092B-C50C-407E-A947-70E740481C1C}">
-                <a14:useLocalDpi xmlns:a14="http://schemas.microsoft.com/office/drawing/2010/main" val="0"/>
-              </a:ext>
-              <a:ext uri="{96DAC541-7B7A-43D3-8B79-37D633B846F1}">
-                <asvg:svgBlip xmlns:asvg="http://schemas.microsoft.com/office/drawing/2016/SVG/main" r:embed="rId23"/>
-              </a:ext>
-            </a:extLst>
-          </a:blip>
-          <a:stretch>
-            <a:fillRect/>
-          </a:stretch>
-        </p:blipFill>
-        <p:spPr>
-          <a:xfrm>
-            <a:off x="7104323" y="4630826"/>
-            <a:ext cx="1260000" cy="1260000"/>
-          </a:xfrm>
-          <a:prstGeom prst="rect">
-            <a:avLst/>
-          </a:prstGeom>
-        </p:spPr>
-      </p:pic>
-      <p:pic>
-        <p:nvPicPr>
-          <p:cNvPr id="29" name="Graphic 28" descr="Car with solid fill">
-            <a:extLst>
-              <a:ext uri="{FF2B5EF4-FFF2-40B4-BE49-F238E27FC236}">
-                <a16:creationId xmlns:a16="http://schemas.microsoft.com/office/drawing/2014/main" id="{5B9ACB3A-0D8B-1CA4-C3E4-D26323F81A52}"/>
-              </a:ext>
-            </a:extLst>
-          </p:cNvPr>
-          <p:cNvPicPr>
-            <a:picLocks noChangeAspect="1"/>
-          </p:cNvPicPr>
-          <p:nvPr/>
-        </p:nvPicPr>
-        <p:blipFill>
-          <a:blip r:embed="rId24">
-            <a:extLst>
-              <a:ext uri="{28A0092B-C50C-407E-A947-70E740481C1C}">
-                <a14:useLocalDpi xmlns:a14="http://schemas.microsoft.com/office/drawing/2010/main" val="0"/>
-              </a:ext>
-              <a:ext uri="{96DAC541-7B7A-43D3-8B79-37D633B846F1}">
-                <asvg:svgBlip xmlns:asvg="http://schemas.microsoft.com/office/drawing/2016/SVG/main" r:embed="rId25"/>
-              </a:ext>
-            </a:extLst>
-          </a:blip>
-          <a:stretch>
-            <a:fillRect/>
-          </a:stretch>
-        </p:blipFill>
-        <p:spPr>
-          <a:xfrm>
-            <a:off x="7243316" y="1112531"/>
-            <a:ext cx="1260000" cy="1260000"/>
-          </a:xfrm>
-          <a:prstGeom prst="rect">
-            <a:avLst/>
-          </a:prstGeom>
-        </p:spPr>
-      </p:pic>
-      <p:pic>
-        <p:nvPicPr>
-          <p:cNvPr id="31" name="Graphic 30" descr="Credit card with solid fill">
-            <a:extLst>
-              <a:ext uri="{FF2B5EF4-FFF2-40B4-BE49-F238E27FC236}">
-                <a16:creationId xmlns:a16="http://schemas.microsoft.com/office/drawing/2014/main" id="{D45804A0-7F5A-C4E9-B5AA-2DDA49614758}"/>
-              </a:ext>
-            </a:extLst>
-          </p:cNvPr>
-          <p:cNvPicPr>
-            <a:picLocks noChangeAspect="1"/>
-          </p:cNvPicPr>
-          <p:nvPr/>
-        </p:nvPicPr>
-        <p:blipFill>
-          <a:blip r:embed="rId26">
-            <a:extLst>
-              <a:ext uri="{28A0092B-C50C-407E-A947-70E740481C1C}">
-                <a14:useLocalDpi xmlns:a14="http://schemas.microsoft.com/office/drawing/2010/main" val="0"/>
-              </a:ext>
-              <a:ext uri="{96DAC541-7B7A-43D3-8B79-37D633B846F1}">
-                <asvg:svgBlip xmlns:asvg="http://schemas.microsoft.com/office/drawing/2016/SVG/main" r:embed="rId27"/>
-              </a:ext>
-            </a:extLst>
-          </a:blip>
-          <a:stretch>
-            <a:fillRect/>
-          </a:stretch>
-        </p:blipFill>
-        <p:spPr>
-          <a:xfrm>
-            <a:off x="7013183" y="3223508"/>
-            <a:ext cx="1260000" cy="1260000"/>
-          </a:xfrm>
-          <a:prstGeom prst="rect">
-            <a:avLst/>
-          </a:prstGeom>
-        </p:spPr>
-      </p:pic>
-      <p:pic>
-        <p:nvPicPr>
-          <p:cNvPr id="33" name="Graphic 32" descr="Work from home Wi-Fi with solid fill">
-            <a:extLst>
-              <a:ext uri="{FF2B5EF4-FFF2-40B4-BE49-F238E27FC236}">
-                <a16:creationId xmlns:a16="http://schemas.microsoft.com/office/drawing/2014/main" id="{22CB523C-9574-8E38-E886-440EE0A493C2}"/>
-              </a:ext>
-            </a:extLst>
-          </p:cNvPr>
-          <p:cNvPicPr>
-            <a:picLocks noChangeAspect="1"/>
-          </p:cNvPicPr>
-          <p:nvPr/>
-        </p:nvPicPr>
-        <p:blipFill>
-          <a:blip r:embed="rId28">
-            <a:extLst>
-              <a:ext uri="{28A0092B-C50C-407E-A947-70E740481C1C}">
-                <a14:useLocalDpi xmlns:a14="http://schemas.microsoft.com/office/drawing/2010/main" val="0"/>
-              </a:ext>
-              <a:ext uri="{96DAC541-7B7A-43D3-8B79-37D633B846F1}">
-                <asvg:svgBlip xmlns:asvg="http://schemas.microsoft.com/office/drawing/2016/SVG/main" r:embed="rId29"/>
-              </a:ext>
-            </a:extLst>
-          </a:blip>
-          <a:stretch>
-            <a:fillRect/>
-          </a:stretch>
-        </p:blipFill>
-        <p:spPr>
-          <a:xfrm>
-            <a:off x="2387295" y="2311958"/>
-            <a:ext cx="1260000" cy="1260000"/>
-          </a:xfrm>
-          <a:prstGeom prst="rect">
-            <a:avLst/>
-          </a:prstGeom>
-        </p:spPr>
-      </p:pic>
-      <p:pic>
-        <p:nvPicPr>
-          <p:cNvPr id="35" name="Graphic 34" descr="Online meeting with solid fill">
-            <a:extLst>
-              <a:ext uri="{FF2B5EF4-FFF2-40B4-BE49-F238E27FC236}">
-                <a16:creationId xmlns:a16="http://schemas.microsoft.com/office/drawing/2014/main" id="{AED8CE27-EFA5-D5AF-7761-6A3892890C5C}"/>
-              </a:ext>
-            </a:extLst>
-          </p:cNvPr>
-          <p:cNvPicPr>
-            <a:picLocks noChangeAspect="1"/>
-          </p:cNvPicPr>
-          <p:nvPr/>
-        </p:nvPicPr>
-        <p:blipFill>
-          <a:blip r:embed="rId30">
-            <a:extLst>
-              <a:ext uri="{28A0092B-C50C-407E-A947-70E740481C1C}">
-                <a14:useLocalDpi xmlns:a14="http://schemas.microsoft.com/office/drawing/2010/main" val="0"/>
-              </a:ext>
-              <a:ext uri="{96DAC541-7B7A-43D3-8B79-37D633B846F1}">
-                <asvg:svgBlip xmlns:asvg="http://schemas.microsoft.com/office/drawing/2016/SVG/main" r:embed="rId31"/>
-              </a:ext>
-            </a:extLst>
-          </a:blip>
-          <a:stretch>
-            <a:fillRect/>
-          </a:stretch>
-        </p:blipFill>
-        <p:spPr>
-          <a:xfrm>
-            <a:off x="274580" y="2519849"/>
-            <a:ext cx="1260000" cy="1260000"/>
-          </a:xfrm>
-          <a:prstGeom prst="rect">
-            <a:avLst/>
-          </a:prstGeom>
-        </p:spPr>
-      </p:pic>
-      <p:pic>
-        <p:nvPicPr>
-          <p:cNvPr id="37" name="Graphic 36" descr="Connections with solid fill">
-            <a:extLst>
-              <a:ext uri="{FF2B5EF4-FFF2-40B4-BE49-F238E27FC236}">
-                <a16:creationId xmlns:a16="http://schemas.microsoft.com/office/drawing/2014/main" id="{2D9152D3-3906-8FF1-44AF-2A167688D808}"/>
-              </a:ext>
-            </a:extLst>
-          </p:cNvPr>
-          <p:cNvPicPr>
-            <a:picLocks noChangeAspect="1"/>
-          </p:cNvPicPr>
-          <p:nvPr/>
-        </p:nvPicPr>
-        <p:blipFill>
-          <a:blip r:embed="rId32">
-            <a:extLst>
-              <a:ext uri="{28A0092B-C50C-407E-A947-70E740481C1C}">
-                <a14:useLocalDpi xmlns:a14="http://schemas.microsoft.com/office/drawing/2010/main" val="0"/>
-              </a:ext>
-              <a:ext uri="{96DAC541-7B7A-43D3-8B79-37D633B846F1}">
-                <asvg:svgBlip xmlns:asvg="http://schemas.microsoft.com/office/drawing/2016/SVG/main" r:embed="rId33"/>
-              </a:ext>
-            </a:extLst>
-          </a:blip>
-          <a:stretch>
-            <a:fillRect/>
-          </a:stretch>
-        </p:blipFill>
-        <p:spPr>
-          <a:xfrm>
-            <a:off x="5844323" y="4161720"/>
-            <a:ext cx="1260000" cy="1260000"/>
-          </a:xfrm>
-          <a:prstGeom prst="rect">
-            <a:avLst/>
-          </a:prstGeom>
-        </p:spPr>
-      </p:pic>
-      <p:pic>
-        <p:nvPicPr>
-          <p:cNvPr id="39" name="Graphic 38" descr="Fingerprint outline">
-            <a:extLst>
-              <a:ext uri="{FF2B5EF4-FFF2-40B4-BE49-F238E27FC236}">
-                <a16:creationId xmlns:a16="http://schemas.microsoft.com/office/drawing/2014/main" id="{35982AD6-A7D4-5848-7B57-609D4C5D31C2}"/>
-              </a:ext>
-            </a:extLst>
-          </p:cNvPr>
-          <p:cNvPicPr>
-            <a:picLocks noChangeAspect="1"/>
-          </p:cNvPicPr>
-          <p:nvPr/>
-        </p:nvPicPr>
-        <p:blipFill>
-          <a:blip r:embed="rId34">
-            <a:extLst>
-              <a:ext uri="{28A0092B-C50C-407E-A947-70E740481C1C}">
-                <a14:useLocalDpi xmlns:a14="http://schemas.microsoft.com/office/drawing/2010/main" val="0"/>
-              </a:ext>
-              <a:ext uri="{96DAC541-7B7A-43D3-8B79-37D633B846F1}">
-                <asvg:svgBlip xmlns:asvg="http://schemas.microsoft.com/office/drawing/2016/SVG/main" r:embed="rId35"/>
-              </a:ext>
-            </a:extLst>
-          </a:blip>
-          <a:stretch>
-            <a:fillRect/>
-          </a:stretch>
-        </p:blipFill>
-        <p:spPr>
-          <a:xfrm>
-            <a:off x="631031" y="4396273"/>
-            <a:ext cx="1260000" cy="1260000"/>
-          </a:xfrm>
-          <a:prstGeom prst="rect">
-            <a:avLst/>
-          </a:prstGeom>
-        </p:spPr>
-      </p:pic>
-      <p:pic>
-        <p:nvPicPr>
-          <p:cNvPr id="41" name="Graphic 40" descr="Inbox with solid fill">
-            <a:extLst>
-              <a:ext uri="{FF2B5EF4-FFF2-40B4-BE49-F238E27FC236}">
-                <a16:creationId xmlns:a16="http://schemas.microsoft.com/office/drawing/2014/main" id="{8B10A555-3CFB-6575-F669-D50811AD6A0B}"/>
-              </a:ext>
-            </a:extLst>
-          </p:cNvPr>
-          <p:cNvPicPr>
-            <a:picLocks noChangeAspect="1"/>
-          </p:cNvPicPr>
-          <p:nvPr/>
-        </p:nvPicPr>
-        <p:blipFill>
-          <a:blip r:embed="rId36">
-            <a:extLst>
-              <a:ext uri="{28A0092B-C50C-407E-A947-70E740481C1C}">
-                <a14:useLocalDpi xmlns:a14="http://schemas.microsoft.com/office/drawing/2010/main" val="0"/>
-              </a:ext>
-              <a:ext uri="{96DAC541-7B7A-43D3-8B79-37D633B846F1}">
-                <asvg:svgBlip xmlns:asvg="http://schemas.microsoft.com/office/drawing/2016/SVG/main" r:embed="rId37"/>
-              </a:ext>
-            </a:extLst>
-          </a:blip>
-          <a:stretch>
-            <a:fillRect/>
-          </a:stretch>
-        </p:blipFill>
-        <p:spPr>
-          <a:xfrm>
-            <a:off x="4402120" y="3788451"/>
-            <a:ext cx="1260000" cy="1260000"/>
-          </a:xfrm>
-          <a:prstGeom prst="rect">
-            <a:avLst/>
-          </a:prstGeom>
-        </p:spPr>
-      </p:pic>
-      <p:pic>
-        <p:nvPicPr>
-          <p:cNvPr id="43" name="Graphic 42" descr="Influencer with solid fill">
-            <a:extLst>
-              <a:ext uri="{FF2B5EF4-FFF2-40B4-BE49-F238E27FC236}">
-                <a16:creationId xmlns:a16="http://schemas.microsoft.com/office/drawing/2014/main" id="{01B11ADF-A4CA-5D2E-8F0F-74A26225C038}"/>
-              </a:ext>
-            </a:extLst>
-          </p:cNvPr>
-          <p:cNvPicPr>
-            <a:picLocks noChangeAspect="1"/>
-          </p:cNvPicPr>
-          <p:nvPr/>
-        </p:nvPicPr>
-        <p:blipFill>
-          <a:blip r:embed="rId38">
-            <a:extLst>
-              <a:ext uri="{28A0092B-C50C-407E-A947-70E740481C1C}">
-                <a14:useLocalDpi xmlns:a14="http://schemas.microsoft.com/office/drawing/2010/main" val="0"/>
-              </a:ext>
-              <a:ext uri="{96DAC541-7B7A-43D3-8B79-37D633B846F1}">
-                <asvg:svgBlip xmlns:asvg="http://schemas.microsoft.com/office/drawing/2016/SVG/main" r:embed="rId39"/>
-              </a:ext>
-            </a:extLst>
-          </a:blip>
-          <a:stretch>
-            <a:fillRect/>
-          </a:stretch>
-        </p:blipFill>
-        <p:spPr>
-          <a:xfrm>
-            <a:off x="1454901" y="1347084"/>
-            <a:ext cx="1260000" cy="1260000"/>
-          </a:xfrm>
-          <a:prstGeom prst="rect">
-            <a:avLst/>
-          </a:prstGeom>
-        </p:spPr>
-      </p:pic>
-      <p:pic>
-        <p:nvPicPr>
-          <p:cNvPr id="45" name="Graphic 44" descr="Internet Of Things with solid fill">
-            <a:extLst>
-              <a:ext uri="{FF2B5EF4-FFF2-40B4-BE49-F238E27FC236}">
-                <a16:creationId xmlns:a16="http://schemas.microsoft.com/office/drawing/2014/main" id="{6C44137F-556A-6D90-AD51-B31693F77D41}"/>
-              </a:ext>
-            </a:extLst>
-          </p:cNvPr>
-          <p:cNvPicPr>
-            <a:picLocks noChangeAspect="1"/>
-          </p:cNvPicPr>
-          <p:nvPr/>
-        </p:nvPicPr>
-        <p:blipFill>
-          <a:blip r:embed="rId40">
-            <a:extLst>
-              <a:ext uri="{28A0092B-C50C-407E-A947-70E740481C1C}">
-                <a14:useLocalDpi xmlns:a14="http://schemas.microsoft.com/office/drawing/2010/main" val="0"/>
-              </a:ext>
-              <a:ext uri="{96DAC541-7B7A-43D3-8B79-37D633B846F1}">
-                <asvg:svgBlip xmlns:asvg="http://schemas.microsoft.com/office/drawing/2016/SVG/main" r:embed="rId41"/>
-              </a:ext>
-            </a:extLst>
-          </a:blip>
-          <a:stretch>
-            <a:fillRect/>
-          </a:stretch>
-        </p:blipFill>
-        <p:spPr>
-          <a:xfrm>
-            <a:off x="1435558" y="3458061"/>
-            <a:ext cx="1260000" cy="1260000"/>
-          </a:xfrm>
-          <a:prstGeom prst="rect">
-            <a:avLst/>
-          </a:prstGeom>
-        </p:spPr>
-      </p:pic>
-      <p:pic>
-        <p:nvPicPr>
-          <p:cNvPr id="47" name="Graphic 46" descr="Laptop with solid fill">
-            <a:extLst>
-              <a:ext uri="{FF2B5EF4-FFF2-40B4-BE49-F238E27FC236}">
-                <a16:creationId xmlns:a16="http://schemas.microsoft.com/office/drawing/2014/main" id="{4DE1CDFD-AA0C-95A4-AFF8-2BF7431BD792}"/>
-              </a:ext>
-            </a:extLst>
-          </p:cNvPr>
-          <p:cNvPicPr>
-            <a:picLocks noChangeAspect="1"/>
-          </p:cNvPicPr>
-          <p:nvPr/>
-        </p:nvPicPr>
-        <p:blipFill>
-          <a:blip r:embed="rId42">
-            <a:extLst>
-              <a:ext uri="{28A0092B-C50C-407E-A947-70E740481C1C}">
-                <a14:useLocalDpi xmlns:a14="http://schemas.microsoft.com/office/drawing/2010/main" val="0"/>
-              </a:ext>
-              <a:ext uri="{96DAC541-7B7A-43D3-8B79-37D633B846F1}">
-                <asvg:svgBlip xmlns:asvg="http://schemas.microsoft.com/office/drawing/2016/SVG/main" r:embed="rId43"/>
-              </a:ext>
-            </a:extLst>
-          </a:blip>
-          <a:stretch>
-            <a:fillRect/>
-          </a:stretch>
-        </p:blipFill>
-        <p:spPr>
-          <a:xfrm>
-            <a:off x="3215777" y="5099932"/>
-            <a:ext cx="1260000" cy="1260000"/>
-          </a:xfrm>
-          <a:prstGeom prst="rect">
-            <a:avLst/>
-          </a:prstGeom>
-        </p:spPr>
-      </p:pic>
-      <p:pic>
-        <p:nvPicPr>
-          <p:cNvPr id="51" name="Graphic 50" descr="Meeting with solid fill">
-            <a:extLst>
-              <a:ext uri="{FF2B5EF4-FFF2-40B4-BE49-F238E27FC236}">
-                <a16:creationId xmlns:a16="http://schemas.microsoft.com/office/drawing/2014/main" id="{A1B3CDD8-B9F8-E9FE-E93E-46F4D9C243C3}"/>
-              </a:ext>
-            </a:extLst>
-          </p:cNvPr>
-          <p:cNvPicPr>
-            <a:picLocks noChangeAspect="1"/>
-          </p:cNvPicPr>
-          <p:nvPr/>
-        </p:nvPicPr>
-        <p:blipFill>
-          <a:blip r:embed="rId44">
-            <a:extLst>
-              <a:ext uri="{28A0092B-C50C-407E-A947-70E740481C1C}">
-                <a14:useLocalDpi xmlns:a14="http://schemas.microsoft.com/office/drawing/2010/main" val="0"/>
-              </a:ext>
-              <a:ext uri="{96DAC541-7B7A-43D3-8B79-37D633B846F1}">
-                <asvg:svgBlip xmlns:asvg="http://schemas.microsoft.com/office/drawing/2016/SVG/main" r:embed="rId45"/>
-              </a:ext>
-            </a:extLst>
-          </a:blip>
-          <a:stretch>
-            <a:fillRect/>
-          </a:stretch>
-        </p:blipFill>
-        <p:spPr>
-          <a:xfrm>
-            <a:off x="5659279" y="1581637"/>
-            <a:ext cx="1260000" cy="1260000"/>
-          </a:xfrm>
-          <a:prstGeom prst="rect">
-            <a:avLst/>
-          </a:prstGeom>
-        </p:spPr>
-      </p:pic>
-      <p:pic>
-        <p:nvPicPr>
-          <p:cNvPr id="53" name="Graphic 52" descr="Monitor with solid fill">
-            <a:extLst>
-              <a:ext uri="{FF2B5EF4-FFF2-40B4-BE49-F238E27FC236}">
-                <a16:creationId xmlns:a16="http://schemas.microsoft.com/office/drawing/2014/main" id="{1CED1216-F781-CCA7-62E0-80D7D9FAD777}"/>
-              </a:ext>
-            </a:extLst>
-          </p:cNvPr>
-          <p:cNvPicPr>
-            <a:picLocks noChangeAspect="1"/>
-          </p:cNvPicPr>
-          <p:nvPr/>
-        </p:nvPicPr>
-        <p:blipFill>
-          <a:blip r:embed="rId46">
-            <a:extLst>
-              <a:ext uri="{28A0092B-C50C-407E-A947-70E740481C1C}">
-                <a14:useLocalDpi xmlns:a14="http://schemas.microsoft.com/office/drawing/2010/main" val="0"/>
-              </a:ext>
-              <a:ext uri="{96DAC541-7B7A-43D3-8B79-37D633B846F1}">
-                <asvg:svgBlip xmlns:asvg="http://schemas.microsoft.com/office/drawing/2016/SVG/main" r:embed="rId47"/>
-              </a:ext>
-            </a:extLst>
-          </a:blip>
-          <a:stretch>
-            <a:fillRect/>
-          </a:stretch>
-        </p:blipFill>
-        <p:spPr>
-          <a:xfrm>
-            <a:off x="7081812" y="2050743"/>
-            <a:ext cx="1260000" cy="1260000"/>
-          </a:xfrm>
-          <a:prstGeom prst="rect">
-            <a:avLst/>
-          </a:prstGeom>
-        </p:spPr>
-      </p:pic>
+      <p:grpSp>
+        <p:nvGrpSpPr>
+          <p:cNvPr id="14" name="Gruppieren 13">
+            <a:extLst>
+              <a:ext uri="{FF2B5EF4-FFF2-40B4-BE49-F238E27FC236}">
+                <a16:creationId xmlns:a16="http://schemas.microsoft.com/office/drawing/2014/main" id="{7B6A61D4-F93C-D035-E038-FBE1A8A351B5}"/>
+              </a:ext>
+            </a:extLst>
+          </p:cNvPr>
+          <p:cNvGrpSpPr/>
+          <p:nvPr/>
+        </p:nvGrpSpPr>
+        <p:grpSpPr>
+          <a:xfrm>
+            <a:off x="123350" y="719418"/>
+            <a:ext cx="8926285" cy="5192794"/>
+            <a:chOff x="829427" y="552468"/>
+            <a:chExt cx="10189428" cy="5927617"/>
+          </a:xfrm>
+        </p:grpSpPr>
+        <p:sp>
+          <p:nvSpPr>
+            <p:cNvPr id="2" name="Form 1">
+              <a:extLst>
+                <a:ext uri="{FF2B5EF4-FFF2-40B4-BE49-F238E27FC236}">
+                  <a16:creationId xmlns:a16="http://schemas.microsoft.com/office/drawing/2014/main" id="{F4DA2D4B-F6B3-DEDC-5BA1-AAD88C99612D}"/>
+                </a:ext>
+              </a:extLst>
+            </p:cNvPr>
+            <p:cNvSpPr/>
+            <p:nvPr/>
+          </p:nvSpPr>
+          <p:spPr>
+            <a:xfrm>
+              <a:off x="1282635" y="2077740"/>
+              <a:ext cx="6425412" cy="4015883"/>
+            </a:xfrm>
+            <a:prstGeom prst="swooshArrow">
+              <a:avLst>
+                <a:gd name="adj1" fmla="val 25000"/>
+                <a:gd name="adj2" fmla="val 25000"/>
+              </a:avLst>
+            </a:prstGeom>
+            <a:solidFill>
+              <a:srgbClr val="04316A"/>
+            </a:solidFill>
+            <a:ln>
+              <a:solidFill>
+                <a:schemeClr val="bg1"/>
+              </a:solidFill>
+            </a:ln>
+          </p:spPr>
+          <p:style>
+            <a:lnRef idx="0">
+              <a:schemeClr val="accent1">
+                <a:hueOff val="0"/>
+                <a:satOff val="0"/>
+                <a:lumOff val="0"/>
+                <a:alphaOff val="0"/>
+              </a:schemeClr>
+            </a:lnRef>
+            <a:fillRef idx="1">
+              <a:scrgbClr r="0" g="0" b="0"/>
+            </a:fillRef>
+            <a:effectRef idx="0">
+              <a:schemeClr val="accent1">
+                <a:tint val="40000"/>
+                <a:hueOff val="0"/>
+                <a:satOff val="0"/>
+                <a:lumOff val="0"/>
+                <a:alphaOff val="0"/>
+              </a:schemeClr>
+            </a:effectRef>
+            <a:fontRef idx="minor">
+              <a:schemeClr val="dk1">
+                <a:hueOff val="0"/>
+                <a:satOff val="0"/>
+                <a:lumOff val="0"/>
+                <a:alphaOff val="0"/>
+              </a:schemeClr>
+            </a:fontRef>
+          </p:style>
+        </p:sp>
+        <p:pic>
+          <p:nvPicPr>
+            <p:cNvPr id="3" name="Grafik 2">
+              <a:extLst>
+                <a:ext uri="{FF2B5EF4-FFF2-40B4-BE49-F238E27FC236}">
+                  <a16:creationId xmlns:a16="http://schemas.microsoft.com/office/drawing/2014/main" id="{35ACD49E-E390-3719-881A-434DCDB73F1D}"/>
+                </a:ext>
+              </a:extLst>
+            </p:cNvPr>
+            <p:cNvPicPr>
+              <a:picLocks noChangeAspect="1"/>
+            </p:cNvPicPr>
+            <p:nvPr/>
+          </p:nvPicPr>
+          <p:blipFill>
+            <a:blip r:embed="rId2">
+              <a:extLst>
+                <a:ext uri="{96DAC541-7B7A-43D3-8B79-37D633B846F1}">
+                  <asvg:svgBlip xmlns:asvg="http://schemas.microsoft.com/office/drawing/2016/SVG/main" r:embed="rId3"/>
+                </a:ext>
+              </a:extLst>
+            </a:blip>
+            <a:stretch>
+              <a:fillRect/>
+            </a:stretch>
+          </p:blipFill>
+          <p:spPr>
+            <a:xfrm>
+              <a:off x="7862808" y="1516188"/>
+              <a:ext cx="3156047" cy="2805376"/>
+            </a:xfrm>
+            <a:prstGeom prst="rect">
+              <a:avLst/>
+            </a:prstGeom>
+          </p:spPr>
+        </p:pic>
+        <p:pic>
+          <p:nvPicPr>
+            <p:cNvPr id="4" name="Grafik 3">
+              <a:extLst>
+                <a:ext uri="{FF2B5EF4-FFF2-40B4-BE49-F238E27FC236}">
+                  <a16:creationId xmlns:a16="http://schemas.microsoft.com/office/drawing/2014/main" id="{69E8E515-17B0-36A8-2EA6-5FFC1B63534E}"/>
+                </a:ext>
+              </a:extLst>
+            </p:cNvPr>
+            <p:cNvPicPr>
+              <a:picLocks noChangeAspect="1"/>
+            </p:cNvPicPr>
+            <p:nvPr/>
+          </p:nvPicPr>
+          <p:blipFill>
+            <a:blip r:embed="rId4">
+              <a:extLst>
+                <a:ext uri="{96DAC541-7B7A-43D3-8B79-37D633B846F1}">
+                  <asvg:svgBlip xmlns:asvg="http://schemas.microsoft.com/office/drawing/2016/SVG/main" r:embed="rId5"/>
+                </a:ext>
+              </a:extLst>
+            </a:blip>
+            <a:stretch>
+              <a:fillRect/>
+            </a:stretch>
+          </p:blipFill>
+          <p:spPr>
+            <a:xfrm>
+              <a:off x="829427" y="5247667"/>
+              <a:ext cx="1350000" cy="1080000"/>
+            </a:xfrm>
+            <a:prstGeom prst="rect">
+              <a:avLst/>
+            </a:prstGeom>
+          </p:spPr>
+        </p:pic>
+        <p:sp>
+          <p:nvSpPr>
+            <p:cNvPr id="5" name="Form 4">
+              <a:extLst>
+                <a:ext uri="{FF2B5EF4-FFF2-40B4-BE49-F238E27FC236}">
+                  <a16:creationId xmlns:a16="http://schemas.microsoft.com/office/drawing/2014/main" id="{71E86DBC-AD61-78A3-1B42-25A6DD561B90}"/>
+                </a:ext>
+              </a:extLst>
+            </p:cNvPr>
+            <p:cNvSpPr/>
+            <p:nvPr/>
+          </p:nvSpPr>
+          <p:spPr>
+            <a:xfrm rot="2193930">
+              <a:off x="3134807" y="1313647"/>
+              <a:ext cx="2608149" cy="2608546"/>
+            </a:xfrm>
+            <a:prstGeom prst="leftCircularArrow">
+              <a:avLst>
+                <a:gd name="adj1" fmla="val 10980"/>
+                <a:gd name="adj2" fmla="val 1142322"/>
+                <a:gd name="adj3" fmla="val 6300000"/>
+                <a:gd name="adj4" fmla="val 717455"/>
+                <a:gd name="adj5" fmla="val 12500"/>
+              </a:avLst>
+            </a:prstGeom>
+            <a:solidFill>
+              <a:srgbClr val="AA2C3D"/>
+            </a:solidFill>
+            <a:ln w="12700">
+              <a:solidFill>
+                <a:schemeClr val="bg1"/>
+              </a:solidFill>
+            </a:ln>
+          </p:spPr>
+          <p:style>
+            <a:lnRef idx="2">
+              <a:schemeClr val="lt1">
+                <a:hueOff val="0"/>
+                <a:satOff val="0"/>
+                <a:lumOff val="0"/>
+                <a:alphaOff val="0"/>
+              </a:schemeClr>
+            </a:lnRef>
+            <a:fillRef idx="1">
+              <a:schemeClr val="accent1">
+                <a:hueOff val="0"/>
+                <a:satOff val="0"/>
+                <a:lumOff val="0"/>
+                <a:alphaOff val="0"/>
+              </a:schemeClr>
+            </a:fillRef>
+            <a:effectRef idx="0">
+              <a:schemeClr val="accent1">
+                <a:hueOff val="0"/>
+                <a:satOff val="0"/>
+                <a:lumOff val="0"/>
+                <a:alphaOff val="0"/>
+              </a:schemeClr>
+            </a:effectRef>
+            <a:fontRef idx="minor">
+              <a:schemeClr val="lt1"/>
+            </a:fontRef>
+          </p:style>
+        </p:sp>
+        <p:pic>
+          <p:nvPicPr>
+            <p:cNvPr id="6" name="Grafik 5">
+              <a:extLst>
+                <a:ext uri="{FF2B5EF4-FFF2-40B4-BE49-F238E27FC236}">
+                  <a16:creationId xmlns:a16="http://schemas.microsoft.com/office/drawing/2014/main" id="{5A6830BB-0687-0DC6-2174-704BBA7BF4DF}"/>
+                </a:ext>
+              </a:extLst>
+            </p:cNvPr>
+            <p:cNvPicPr>
+              <a:picLocks noChangeAspect="1"/>
+            </p:cNvPicPr>
+            <p:nvPr/>
+          </p:nvPicPr>
+          <p:blipFill>
+            <a:blip r:embed="rId6">
+              <a:extLst>
+                <a:ext uri="{96DAC541-7B7A-43D3-8B79-37D633B846F1}">
+                  <asvg:svgBlip xmlns:asvg="http://schemas.microsoft.com/office/drawing/2016/SVG/main" r:embed="rId7"/>
+                </a:ext>
+              </a:extLst>
+            </a:blip>
+            <a:stretch>
+              <a:fillRect/>
+            </a:stretch>
+          </p:blipFill>
+          <p:spPr>
+            <a:xfrm>
+              <a:off x="2226791" y="4317431"/>
+              <a:ext cx="900000" cy="720000"/>
+            </a:xfrm>
+            <a:prstGeom prst="rect">
+              <a:avLst/>
+            </a:prstGeom>
+          </p:spPr>
+        </p:pic>
+        <p:pic>
+          <p:nvPicPr>
+            <p:cNvPr id="7" name="Grafik 6">
+              <a:extLst>
+                <a:ext uri="{FF2B5EF4-FFF2-40B4-BE49-F238E27FC236}">
+                  <a16:creationId xmlns:a16="http://schemas.microsoft.com/office/drawing/2014/main" id="{CA2AD4F9-1F98-C299-DD78-01F934B4FBEB}"/>
+                </a:ext>
+              </a:extLst>
+            </p:cNvPr>
+            <p:cNvPicPr>
+              <a:picLocks noChangeAspect="1"/>
+            </p:cNvPicPr>
+            <p:nvPr/>
+          </p:nvPicPr>
+          <p:blipFill>
+            <a:blip r:embed="rId8">
+              <a:extLst>
+                <a:ext uri="{96DAC541-7B7A-43D3-8B79-37D633B846F1}">
+                  <asvg:svgBlip xmlns:asvg="http://schemas.microsoft.com/office/drawing/2016/SVG/main" r:embed="rId9"/>
+                </a:ext>
+              </a:extLst>
+            </a:blip>
+            <a:stretch>
+              <a:fillRect/>
+            </a:stretch>
+          </p:blipFill>
+          <p:spPr>
+            <a:xfrm>
+              <a:off x="4018423" y="2832061"/>
+              <a:ext cx="892380" cy="1338570"/>
+            </a:xfrm>
+            <a:prstGeom prst="rect">
+              <a:avLst/>
+            </a:prstGeom>
+          </p:spPr>
+        </p:pic>
+        <p:pic>
+          <p:nvPicPr>
+            <p:cNvPr id="8" name="Grafik 7">
+              <a:extLst>
+                <a:ext uri="{FF2B5EF4-FFF2-40B4-BE49-F238E27FC236}">
+                  <a16:creationId xmlns:a16="http://schemas.microsoft.com/office/drawing/2014/main" id="{0F68D8EC-D368-56C2-460F-64EE4820A99D}"/>
+                </a:ext>
+              </a:extLst>
+            </p:cNvPr>
+            <p:cNvPicPr>
+              <a:picLocks noChangeAspect="1"/>
+            </p:cNvPicPr>
+            <p:nvPr/>
+          </p:nvPicPr>
+          <p:blipFill>
+            <a:blip r:embed="rId10">
+              <a:extLst>
+                <a:ext uri="{96DAC541-7B7A-43D3-8B79-37D633B846F1}">
+                  <asvg:svgBlip xmlns:asvg="http://schemas.microsoft.com/office/drawing/2016/SVG/main" r:embed="rId11"/>
+                </a:ext>
+              </a:extLst>
+            </a:blip>
+            <a:stretch>
+              <a:fillRect/>
+            </a:stretch>
+          </p:blipFill>
+          <p:spPr>
+            <a:xfrm>
+              <a:off x="4923162" y="552468"/>
+              <a:ext cx="1262598" cy="1262598"/>
+            </a:xfrm>
+            <a:prstGeom prst="rect">
+              <a:avLst/>
+            </a:prstGeom>
+          </p:spPr>
+        </p:pic>
+        <p:sp>
+          <p:nvSpPr>
+            <p:cNvPr id="9" name="Textfeld 8">
+              <a:extLst>
+                <a:ext uri="{FF2B5EF4-FFF2-40B4-BE49-F238E27FC236}">
+                  <a16:creationId xmlns:a16="http://schemas.microsoft.com/office/drawing/2014/main" id="{5B0A6477-CB8F-F7BE-2A86-39D210516D28}"/>
+                </a:ext>
+              </a:extLst>
+            </p:cNvPr>
+            <p:cNvSpPr txBox="1"/>
+            <p:nvPr/>
+          </p:nvSpPr>
+          <p:spPr>
+            <a:xfrm>
+              <a:off x="1504427" y="6093623"/>
+              <a:ext cx="1914307" cy="386462"/>
+            </a:xfrm>
+            <a:prstGeom prst="rect">
+              <a:avLst/>
+            </a:prstGeom>
+            <a:noFill/>
+          </p:spPr>
+          <p:txBody>
+            <a:bodyPr wrap="square" rtlCol="0">
+              <a:spAutoFit/>
+            </a:bodyPr>
+            <a:lstStyle/>
+            <a:p>
+              <a:r>
+                <a:rPr lang="de-DE" sz="1600" dirty="0">
+                  <a:solidFill>
+                    <a:srgbClr val="AA2C3D"/>
+                  </a:solidFill>
+                  <a:latin typeface="Arial" panose="020B0604020202020204" pitchFamily="34" charset="0"/>
+                  <a:cs typeface="Arial" panose="020B0604020202020204" pitchFamily="34" charset="0"/>
+                </a:rPr>
+                <a:t>Präsentation</a:t>
+              </a:r>
+            </a:p>
+          </p:txBody>
+        </p:sp>
+        <p:sp>
+          <p:nvSpPr>
+            <p:cNvPr id="10" name="Textfeld 9">
+              <a:extLst>
+                <a:ext uri="{FF2B5EF4-FFF2-40B4-BE49-F238E27FC236}">
+                  <a16:creationId xmlns:a16="http://schemas.microsoft.com/office/drawing/2014/main" id="{7B18BF15-961A-49C5-34B7-CE570E0D412C}"/>
+                </a:ext>
+              </a:extLst>
+            </p:cNvPr>
+            <p:cNvSpPr txBox="1"/>
+            <p:nvPr/>
+          </p:nvSpPr>
+          <p:spPr>
+            <a:xfrm>
+              <a:off x="2674371" y="4873029"/>
+              <a:ext cx="2906565" cy="386462"/>
+            </a:xfrm>
+            <a:prstGeom prst="rect">
+              <a:avLst/>
+            </a:prstGeom>
+            <a:noFill/>
+          </p:spPr>
+          <p:txBody>
+            <a:bodyPr wrap="square" rtlCol="0">
+              <a:spAutoFit/>
+            </a:bodyPr>
+            <a:lstStyle/>
+            <a:p>
+              <a:r>
+                <a:rPr lang="de-DE" sz="1600" dirty="0">
+                  <a:solidFill>
+                    <a:srgbClr val="AA2C3D"/>
+                  </a:solidFill>
+                  <a:latin typeface="Arial" panose="020B0604020202020204" pitchFamily="34" charset="0"/>
+                  <a:cs typeface="Arial" panose="020B0604020202020204" pitchFamily="34" charset="0"/>
+                </a:rPr>
+                <a:t>Project </a:t>
+              </a:r>
+              <a:r>
+                <a:rPr lang="de-DE" sz="1600" dirty="0" err="1">
+                  <a:solidFill>
+                    <a:srgbClr val="AA2C3D"/>
+                  </a:solidFill>
+                  <a:latin typeface="Arial" panose="020B0604020202020204" pitchFamily="34" charset="0"/>
+                  <a:cs typeface="Arial" panose="020B0604020202020204" pitchFamily="34" charset="0"/>
+                </a:rPr>
+                <a:t>topic</a:t>
+              </a:r>
+              <a:r>
+                <a:rPr lang="de-DE" sz="1600" dirty="0">
+                  <a:solidFill>
+                    <a:srgbClr val="AA2C3D"/>
+                  </a:solidFill>
+                  <a:latin typeface="Arial" panose="020B0604020202020204" pitchFamily="34" charset="0"/>
+                  <a:cs typeface="Arial" panose="020B0604020202020204" pitchFamily="34" charset="0"/>
+                </a:rPr>
+                <a:t> </a:t>
+              </a:r>
+              <a:r>
+                <a:rPr lang="de-DE" sz="1600" dirty="0" err="1">
+                  <a:solidFill>
+                    <a:srgbClr val="AA2C3D"/>
+                  </a:solidFill>
+                  <a:latin typeface="Arial" panose="020B0604020202020204" pitchFamily="34" charset="0"/>
+                  <a:cs typeface="Arial" panose="020B0604020202020204" pitchFamily="34" charset="0"/>
+                </a:rPr>
+                <a:t>idea</a:t>
+              </a:r>
+              <a:r>
+                <a:rPr lang="de-DE" sz="1600" dirty="0">
+                  <a:solidFill>
+                    <a:srgbClr val="AA2C3D"/>
+                  </a:solidFill>
+                  <a:latin typeface="Arial" panose="020B0604020202020204" pitchFamily="34" charset="0"/>
+                  <a:cs typeface="Arial" panose="020B0604020202020204" pitchFamily="34" charset="0"/>
+                </a:rPr>
+                <a:t>(s)</a:t>
+              </a:r>
+            </a:p>
+          </p:txBody>
+        </p:sp>
+        <p:sp>
+          <p:nvSpPr>
+            <p:cNvPr id="11" name="Textfeld 10">
+              <a:extLst>
+                <a:ext uri="{FF2B5EF4-FFF2-40B4-BE49-F238E27FC236}">
+                  <a16:creationId xmlns:a16="http://schemas.microsoft.com/office/drawing/2014/main" id="{441C6554-CED1-E266-B037-6E6AD4107397}"/>
+                </a:ext>
+              </a:extLst>
+            </p:cNvPr>
+            <p:cNvSpPr txBox="1"/>
+            <p:nvPr/>
+          </p:nvSpPr>
+          <p:spPr>
+            <a:xfrm>
+              <a:off x="4980140" y="3980708"/>
+              <a:ext cx="2411238" cy="386462"/>
+            </a:xfrm>
+            <a:prstGeom prst="rect">
+              <a:avLst/>
+            </a:prstGeom>
+            <a:noFill/>
+          </p:spPr>
+          <p:txBody>
+            <a:bodyPr wrap="square" rtlCol="0">
+              <a:spAutoFit/>
+            </a:bodyPr>
+            <a:lstStyle/>
+            <a:p>
+              <a:r>
+                <a:rPr lang="de-DE" sz="1600" dirty="0">
+                  <a:solidFill>
+                    <a:srgbClr val="AA2C3D"/>
+                  </a:solidFill>
+                  <a:latin typeface="Arial" panose="020B0604020202020204" pitchFamily="34" charset="0"/>
+                  <a:cs typeface="Arial" panose="020B0604020202020204" pitchFamily="34" charset="0"/>
+                </a:rPr>
+                <a:t>Project </a:t>
+              </a:r>
+              <a:r>
+                <a:rPr lang="de-DE" sz="1600" dirty="0" err="1">
+                  <a:solidFill>
+                    <a:srgbClr val="AA2C3D"/>
+                  </a:solidFill>
+                  <a:latin typeface="Arial" panose="020B0604020202020204" pitchFamily="34" charset="0"/>
+                  <a:cs typeface="Arial" panose="020B0604020202020204" pitchFamily="34" charset="0"/>
+                </a:rPr>
+                <a:t>proposal</a:t>
+              </a:r>
+              <a:endParaRPr lang="de-DE" sz="1600" dirty="0">
+                <a:solidFill>
+                  <a:srgbClr val="AA2C3D"/>
+                </a:solidFill>
+                <a:latin typeface="Arial" panose="020B0604020202020204" pitchFamily="34" charset="0"/>
+                <a:cs typeface="Arial" panose="020B0604020202020204" pitchFamily="34" charset="0"/>
+              </a:endParaRPr>
+            </a:p>
+          </p:txBody>
+        </p:sp>
+        <p:sp>
+          <p:nvSpPr>
+            <p:cNvPr id="12" name="Textfeld 11">
+              <a:extLst>
+                <a:ext uri="{FF2B5EF4-FFF2-40B4-BE49-F238E27FC236}">
+                  <a16:creationId xmlns:a16="http://schemas.microsoft.com/office/drawing/2014/main" id="{6C83230C-D680-ACC3-F3FE-846DB0B64763}"/>
+                </a:ext>
+              </a:extLst>
+            </p:cNvPr>
+            <p:cNvSpPr txBox="1"/>
+            <p:nvPr/>
+          </p:nvSpPr>
+          <p:spPr>
+            <a:xfrm>
+              <a:off x="5776108" y="1461050"/>
+              <a:ext cx="1931939" cy="386462"/>
+            </a:xfrm>
+            <a:prstGeom prst="rect">
+              <a:avLst/>
+            </a:prstGeom>
+            <a:noFill/>
+          </p:spPr>
+          <p:txBody>
+            <a:bodyPr wrap="square" rtlCol="0">
+              <a:spAutoFit/>
+            </a:bodyPr>
+            <a:lstStyle/>
+            <a:p>
+              <a:r>
+                <a:rPr lang="de-DE" sz="1600" dirty="0">
+                  <a:solidFill>
+                    <a:srgbClr val="AA2C3D"/>
+                  </a:solidFill>
+                  <a:latin typeface="Arial" panose="020B0604020202020204" pitchFamily="34" charset="0"/>
+                  <a:cs typeface="Arial" panose="020B0604020202020204" pitchFamily="34" charset="0"/>
+                </a:rPr>
+                <a:t>Peer Review</a:t>
+              </a:r>
+            </a:p>
+          </p:txBody>
+        </p:sp>
+        <p:sp>
+          <p:nvSpPr>
+            <p:cNvPr id="13" name="Textfeld 12">
+              <a:extLst>
+                <a:ext uri="{FF2B5EF4-FFF2-40B4-BE49-F238E27FC236}">
+                  <a16:creationId xmlns:a16="http://schemas.microsoft.com/office/drawing/2014/main" id="{54A4FC38-16BF-ED25-B4D9-8E6FC1466DBD}"/>
+                </a:ext>
+              </a:extLst>
+            </p:cNvPr>
+            <p:cNvSpPr txBox="1"/>
+            <p:nvPr/>
+          </p:nvSpPr>
+          <p:spPr>
+            <a:xfrm>
+              <a:off x="8202992" y="4486566"/>
+              <a:ext cx="1810111" cy="386462"/>
+            </a:xfrm>
+            <a:prstGeom prst="rect">
+              <a:avLst/>
+            </a:prstGeom>
+            <a:noFill/>
+          </p:spPr>
+          <p:txBody>
+            <a:bodyPr wrap="square" rtlCol="0">
+              <a:spAutoFit/>
+            </a:bodyPr>
+            <a:lstStyle/>
+            <a:p>
+              <a:r>
+                <a:rPr lang="de-DE" sz="1600" dirty="0">
+                  <a:solidFill>
+                    <a:srgbClr val="AA2C3D"/>
+                  </a:solidFill>
+                  <a:latin typeface="Arial" panose="020B0604020202020204" pitchFamily="34" charset="0"/>
+                  <a:cs typeface="Arial" panose="020B0604020202020204" pitchFamily="34" charset="0"/>
+                </a:rPr>
+                <a:t>Short </a:t>
+              </a:r>
+              <a:r>
+                <a:rPr lang="de-DE" sz="1600" dirty="0" err="1">
+                  <a:solidFill>
+                    <a:srgbClr val="AA2C3D"/>
+                  </a:solidFill>
+                  <a:latin typeface="Arial" panose="020B0604020202020204" pitchFamily="34" charset="0"/>
+                  <a:cs typeface="Arial" panose="020B0604020202020204" pitchFamily="34" charset="0"/>
+                </a:rPr>
+                <a:t>report</a:t>
+              </a:r>
+              <a:endParaRPr lang="de-DE" sz="1600" dirty="0">
+                <a:solidFill>
+                  <a:srgbClr val="AA2C3D"/>
+                </a:solidFill>
+                <a:latin typeface="Arial" panose="020B0604020202020204" pitchFamily="34" charset="0"/>
+                <a:cs typeface="Arial" panose="020B0604020202020204" pitchFamily="34" charset="0"/>
+              </a:endParaRPr>
+            </a:p>
+          </p:txBody>
+        </p:sp>
+      </p:grpSp>
     </p:spTree>
     <p:extLst>
       <p:ext uri="{BB962C8B-B14F-4D97-AF65-F5344CB8AC3E}">
-        <p14:creationId xmlns:p14="http://schemas.microsoft.com/office/powerpoint/2010/main" val="39248893"/>
+        <p14:creationId xmlns:p14="http://schemas.microsoft.com/office/powerpoint/2010/main" val="1068594069"/>
       </p:ext>
     </p:extLst>
   </p:cSld>
@@ -4801,7 +4513,7 @@
     </p:spTree>
     <p:extLst>
       <p:ext uri="{BB962C8B-B14F-4D97-AF65-F5344CB8AC3E}">
-        <p14:creationId xmlns:p14="http://schemas.microsoft.com/office/powerpoint/2010/main" val="2715761318"/>
+        <p14:creationId xmlns:p14="http://schemas.microsoft.com/office/powerpoint/2010/main" val="39248893"/>
       </p:ext>
     </p:extLst>
   </p:cSld>
@@ -5728,6 +5440,933 @@
     </p:spTree>
     <p:extLst>
       <p:ext uri="{BB962C8B-B14F-4D97-AF65-F5344CB8AC3E}">
+        <p14:creationId xmlns:p14="http://schemas.microsoft.com/office/powerpoint/2010/main" val="2715761318"/>
+      </p:ext>
+    </p:extLst>
+  </p:cSld>
+  <p:clrMapOvr>
+    <a:masterClrMapping/>
+  </p:clrMapOvr>
+</p:sld>
+</file>
+
+<file path=ppt/slides/slide4.xml><?xml version="1.0" encoding="utf-8"?>
+<p:sld xmlns:a="http://schemas.openxmlformats.org/drawingml/2006/main" xmlns:r="http://schemas.openxmlformats.org/officeDocument/2006/relationships" xmlns:p="http://schemas.openxmlformats.org/presentationml/2006/main">
+  <p:cSld>
+    <p:spTree>
+      <p:nvGrpSpPr>
+        <p:cNvPr id="1" name=""/>
+        <p:cNvGrpSpPr/>
+        <p:nvPr/>
+      </p:nvGrpSpPr>
+      <p:grpSpPr>
+        <a:xfrm>
+          <a:off x="0" y="0"/>
+          <a:ext cx="0" cy="0"/>
+          <a:chOff x="0" y="0"/>
+          <a:chExt cx="0" cy="0"/>
+        </a:xfrm>
+      </p:grpSpPr>
+      <p:pic>
+        <p:nvPicPr>
+          <p:cNvPr id="3" name="Graphic 2" descr="Taxi with solid fill">
+            <a:extLst>
+              <a:ext uri="{FF2B5EF4-FFF2-40B4-BE49-F238E27FC236}">
+                <a16:creationId xmlns:a16="http://schemas.microsoft.com/office/drawing/2014/main" id="{573C5B3C-1712-3B2C-9599-94DD97AB93A8}"/>
+              </a:ext>
+            </a:extLst>
+          </p:cNvPr>
+          <p:cNvPicPr>
+            <a:picLocks noChangeAspect="1"/>
+          </p:cNvPicPr>
+          <p:nvPr/>
+        </p:nvPicPr>
+        <p:blipFill>
+          <a:blip r:embed="rId2">
+            <a:extLst>
+              <a:ext uri="{28A0092B-C50C-407E-A947-70E740481C1C}">
+                <a14:useLocalDpi xmlns:a14="http://schemas.microsoft.com/office/drawing/2010/main" val="0"/>
+              </a:ext>
+              <a:ext uri="{96DAC541-7B7A-43D3-8B79-37D633B846F1}">
+                <asvg:svgBlip xmlns:asvg="http://schemas.microsoft.com/office/drawing/2016/SVG/main" r:embed="rId3"/>
+              </a:ext>
+            </a:extLst>
+          </a:blip>
+          <a:stretch>
+            <a:fillRect/>
+          </a:stretch>
+        </p:blipFill>
+        <p:spPr>
+          <a:xfrm>
+            <a:off x="2730714" y="906959"/>
+            <a:ext cx="1260000" cy="1260000"/>
+          </a:xfrm>
+          <a:prstGeom prst="rect">
+            <a:avLst/>
+          </a:prstGeom>
+        </p:spPr>
+      </p:pic>
+      <p:pic>
+        <p:nvPicPr>
+          <p:cNvPr id="5" name="Graphic 4" descr="Security camera with solid fill">
+            <a:extLst>
+              <a:ext uri="{FF2B5EF4-FFF2-40B4-BE49-F238E27FC236}">
+                <a16:creationId xmlns:a16="http://schemas.microsoft.com/office/drawing/2014/main" id="{2849CDCE-BE2F-DC1B-CE05-1AB0CA587B01}"/>
+              </a:ext>
+            </a:extLst>
+          </p:cNvPr>
+          <p:cNvPicPr>
+            <a:picLocks noChangeAspect="1"/>
+          </p:cNvPicPr>
+          <p:nvPr/>
+        </p:nvPicPr>
+        <p:blipFill>
+          <a:blip r:embed="rId4">
+            <a:extLst>
+              <a:ext uri="{28A0092B-C50C-407E-A947-70E740481C1C}">
+                <a14:useLocalDpi xmlns:a14="http://schemas.microsoft.com/office/drawing/2010/main" val="0"/>
+              </a:ext>
+              <a:ext uri="{96DAC541-7B7A-43D3-8B79-37D633B846F1}">
+                <asvg:svgBlip xmlns:asvg="http://schemas.microsoft.com/office/drawing/2016/SVG/main" r:embed="rId5"/>
+              </a:ext>
+            </a:extLst>
+          </a:blip>
+          <a:stretch>
+            <a:fillRect/>
+          </a:stretch>
+        </p:blipFill>
+        <p:spPr>
+          <a:xfrm>
+            <a:off x="1054859" y="174319"/>
+            <a:ext cx="1260000" cy="1260000"/>
+          </a:xfrm>
+          <a:prstGeom prst="rect">
+            <a:avLst/>
+          </a:prstGeom>
+        </p:spPr>
+      </p:pic>
+      <p:pic>
+        <p:nvPicPr>
+          <p:cNvPr id="7" name="Graphic 6" descr="Web cam with solid fill">
+            <a:extLst>
+              <a:ext uri="{FF2B5EF4-FFF2-40B4-BE49-F238E27FC236}">
+                <a16:creationId xmlns:a16="http://schemas.microsoft.com/office/drawing/2014/main" id="{5A5F3F7A-367E-30E8-9F96-569A14809476}"/>
+              </a:ext>
+            </a:extLst>
+          </p:cNvPr>
+          <p:cNvPicPr>
+            <a:picLocks noChangeAspect="1"/>
+          </p:cNvPicPr>
+          <p:nvPr/>
+        </p:nvPicPr>
+        <p:blipFill>
+          <a:blip r:embed="rId6">
+            <a:extLst>
+              <a:ext uri="{28A0092B-C50C-407E-A947-70E740481C1C}">
+                <a14:useLocalDpi xmlns:a14="http://schemas.microsoft.com/office/drawing/2010/main" val="0"/>
+              </a:ext>
+              <a:ext uri="{96DAC541-7B7A-43D3-8B79-37D633B846F1}">
+                <asvg:svgBlip xmlns:asvg="http://schemas.microsoft.com/office/drawing/2016/SVG/main" r:embed="rId7"/>
+              </a:ext>
+            </a:extLst>
+          </a:blip>
+          <a:stretch>
+            <a:fillRect/>
+          </a:stretch>
+        </p:blipFill>
+        <p:spPr>
+          <a:xfrm>
+            <a:off x="2662812" y="3980487"/>
+            <a:ext cx="1260000" cy="1260000"/>
+          </a:xfrm>
+          <a:prstGeom prst="rect">
+            <a:avLst/>
+          </a:prstGeom>
+        </p:spPr>
+      </p:pic>
+      <p:pic>
+        <p:nvPicPr>
+          <p:cNvPr id="9" name="Graphic 8" descr="Camera with solid fill">
+            <a:extLst>
+              <a:ext uri="{FF2B5EF4-FFF2-40B4-BE49-F238E27FC236}">
+                <a16:creationId xmlns:a16="http://schemas.microsoft.com/office/drawing/2014/main" id="{F2BE0CF7-FCEF-7FCA-9EBB-F4B293A351DA}"/>
+              </a:ext>
+            </a:extLst>
+          </p:cNvPr>
+          <p:cNvPicPr>
+            <a:picLocks noChangeAspect="1"/>
+          </p:cNvPicPr>
+          <p:nvPr/>
+        </p:nvPicPr>
+        <p:blipFill>
+          <a:blip r:embed="rId8">
+            <a:extLst>
+              <a:ext uri="{28A0092B-C50C-407E-A947-70E740481C1C}">
+                <a14:useLocalDpi xmlns:a14="http://schemas.microsoft.com/office/drawing/2010/main" val="0"/>
+              </a:ext>
+              <a:ext uri="{96DAC541-7B7A-43D3-8B79-37D633B846F1}">
+                <asvg:svgBlip xmlns:asvg="http://schemas.microsoft.com/office/drawing/2016/SVG/main" r:embed="rId9"/>
+              </a:ext>
+            </a:extLst>
+          </a:blip>
+          <a:stretch>
+            <a:fillRect/>
+          </a:stretch>
+        </p:blipFill>
+        <p:spPr>
+          <a:xfrm>
+            <a:off x="4237261" y="593020"/>
+            <a:ext cx="1260000" cy="1260000"/>
+          </a:xfrm>
+          <a:prstGeom prst="rect">
+            <a:avLst/>
+          </a:prstGeom>
+        </p:spPr>
+      </p:pic>
+      <p:pic>
+        <p:nvPicPr>
+          <p:cNvPr id="11" name="Graphic 10" descr="Smart Phone with solid fill">
+            <a:extLst>
+              <a:ext uri="{FF2B5EF4-FFF2-40B4-BE49-F238E27FC236}">
+                <a16:creationId xmlns:a16="http://schemas.microsoft.com/office/drawing/2014/main" id="{B213133E-D1CD-2EB8-AC42-FBE1733FD57B}"/>
+              </a:ext>
+            </a:extLst>
+          </p:cNvPr>
+          <p:cNvPicPr>
+            <a:picLocks noChangeAspect="1"/>
+          </p:cNvPicPr>
+          <p:nvPr/>
+        </p:nvPicPr>
+        <p:blipFill>
+          <a:blip r:embed="rId10">
+            <a:extLst>
+              <a:ext uri="{28A0092B-C50C-407E-A947-70E740481C1C}">
+                <a14:useLocalDpi xmlns:a14="http://schemas.microsoft.com/office/drawing/2010/main" val="0"/>
+              </a:ext>
+              <a:ext uri="{96DAC541-7B7A-43D3-8B79-37D633B846F1}">
+                <asvg:svgBlip xmlns:asvg="http://schemas.microsoft.com/office/drawing/2016/SVG/main" r:embed="rId11"/>
+              </a:ext>
+            </a:extLst>
+          </a:blip>
+          <a:stretch>
+            <a:fillRect/>
+          </a:stretch>
+        </p:blipFill>
+        <p:spPr>
+          <a:xfrm>
+            <a:off x="3556155" y="2988955"/>
+            <a:ext cx="1260000" cy="1260000"/>
+          </a:xfrm>
+          <a:prstGeom prst="rect">
+            <a:avLst/>
+          </a:prstGeom>
+        </p:spPr>
+      </p:pic>
+      <p:pic>
+        <p:nvPicPr>
+          <p:cNvPr id="13" name="Graphic 12" descr="Telephone with solid fill">
+            <a:extLst>
+              <a:ext uri="{FF2B5EF4-FFF2-40B4-BE49-F238E27FC236}">
+                <a16:creationId xmlns:a16="http://schemas.microsoft.com/office/drawing/2014/main" id="{258FBB28-F2A5-F984-C258-5AFF718EFE80}"/>
+              </a:ext>
+            </a:extLst>
+          </p:cNvPr>
+          <p:cNvPicPr>
+            <a:picLocks noChangeAspect="1"/>
+          </p:cNvPicPr>
+          <p:nvPr/>
+        </p:nvPicPr>
+        <p:blipFill>
+          <a:blip r:embed="rId12">
+            <a:extLst>
+              <a:ext uri="{28A0092B-C50C-407E-A947-70E740481C1C}">
+                <a14:useLocalDpi xmlns:a14="http://schemas.microsoft.com/office/drawing/2010/main" val="0"/>
+              </a:ext>
+              <a:ext uri="{96DAC541-7B7A-43D3-8B79-37D633B846F1}">
+                <asvg:svgBlip xmlns:asvg="http://schemas.microsoft.com/office/drawing/2016/SVG/main" r:embed="rId13"/>
+              </a:ext>
+            </a:extLst>
+          </a:blip>
+          <a:stretch>
+            <a:fillRect/>
+          </a:stretch>
+        </p:blipFill>
+        <p:spPr>
+          <a:xfrm>
+            <a:off x="5032120" y="5173591"/>
+            <a:ext cx="1260000" cy="1260000"/>
+          </a:xfrm>
+          <a:prstGeom prst="rect">
+            <a:avLst/>
+          </a:prstGeom>
+        </p:spPr>
+      </p:pic>
+      <p:pic>
+        <p:nvPicPr>
+          <p:cNvPr id="15" name="Graphic 14" descr="Game controller with solid fill">
+            <a:extLst>
+              <a:ext uri="{FF2B5EF4-FFF2-40B4-BE49-F238E27FC236}">
+                <a16:creationId xmlns:a16="http://schemas.microsoft.com/office/drawing/2014/main" id="{1C628A3E-1BFC-2B70-9DBE-61828CC350E9}"/>
+              </a:ext>
+            </a:extLst>
+          </p:cNvPr>
+          <p:cNvPicPr>
+            <a:picLocks noChangeAspect="1"/>
+          </p:cNvPicPr>
+          <p:nvPr/>
+        </p:nvPicPr>
+        <p:blipFill>
+          <a:blip r:embed="rId14">
+            <a:extLst>
+              <a:ext uri="{28A0092B-C50C-407E-A947-70E740481C1C}">
+                <a14:useLocalDpi xmlns:a14="http://schemas.microsoft.com/office/drawing/2010/main" val="0"/>
+              </a:ext>
+              <a:ext uri="{96DAC541-7B7A-43D3-8B79-37D633B846F1}">
+                <asvg:svgBlip xmlns:asvg="http://schemas.microsoft.com/office/drawing/2016/SVG/main" r:embed="rId15"/>
+              </a:ext>
+            </a:extLst>
+          </a:blip>
+          <a:stretch>
+            <a:fillRect/>
+          </a:stretch>
+        </p:blipFill>
+        <p:spPr>
+          <a:xfrm>
+            <a:off x="5282952" y="2754402"/>
+            <a:ext cx="1260000" cy="1260000"/>
+          </a:xfrm>
+          <a:prstGeom prst="rect">
+            <a:avLst/>
+          </a:prstGeom>
+        </p:spPr>
+      </p:pic>
+      <p:pic>
+        <p:nvPicPr>
+          <p:cNvPr id="17" name="Graphic 16" descr="Link with solid fill">
+            <a:extLst>
+              <a:ext uri="{FF2B5EF4-FFF2-40B4-BE49-F238E27FC236}">
+                <a16:creationId xmlns:a16="http://schemas.microsoft.com/office/drawing/2014/main" id="{D5372D78-A4D6-B8CD-7EE0-DCEDEF32E6D6}"/>
+              </a:ext>
+            </a:extLst>
+          </p:cNvPr>
+          <p:cNvPicPr>
+            <a:picLocks noChangeAspect="1"/>
+          </p:cNvPicPr>
+          <p:nvPr/>
+        </p:nvPicPr>
+        <p:blipFill>
+          <a:blip r:embed="rId16">
+            <a:extLst>
+              <a:ext uri="{28A0092B-C50C-407E-A947-70E740481C1C}">
+                <a14:useLocalDpi xmlns:a14="http://schemas.microsoft.com/office/drawing/2010/main" val="0"/>
+              </a:ext>
+              <a:ext uri="{96DAC541-7B7A-43D3-8B79-37D633B846F1}">
+                <asvg:svgBlip xmlns:asvg="http://schemas.microsoft.com/office/drawing/2016/SVG/main" r:embed="rId17"/>
+              </a:ext>
+            </a:extLst>
+          </a:blip>
+          <a:stretch>
+            <a:fillRect/>
+          </a:stretch>
+        </p:blipFill>
+        <p:spPr>
+          <a:xfrm>
+            <a:off x="4293108" y="1825431"/>
+            <a:ext cx="1260000" cy="1260000"/>
+          </a:xfrm>
+          <a:prstGeom prst="rect">
+            <a:avLst/>
+          </a:prstGeom>
+        </p:spPr>
+      </p:pic>
+      <p:pic>
+        <p:nvPicPr>
+          <p:cNvPr id="21" name="Graphic 20" descr="Map with pin with solid fill">
+            <a:extLst>
+              <a:ext uri="{FF2B5EF4-FFF2-40B4-BE49-F238E27FC236}">
+                <a16:creationId xmlns:a16="http://schemas.microsoft.com/office/drawing/2014/main" id="{75C00FAE-B6BE-F219-1310-BAF5681BBEF8}"/>
+              </a:ext>
+            </a:extLst>
+          </p:cNvPr>
+          <p:cNvPicPr>
+            <a:picLocks noChangeAspect="1"/>
+          </p:cNvPicPr>
+          <p:nvPr/>
+        </p:nvPicPr>
+        <p:blipFill>
+          <a:blip r:embed="rId18">
+            <a:extLst>
+              <a:ext uri="{28A0092B-C50C-407E-A947-70E740481C1C}">
+                <a14:useLocalDpi xmlns:a14="http://schemas.microsoft.com/office/drawing/2010/main" val="0"/>
+              </a:ext>
+              <a:ext uri="{96DAC541-7B7A-43D3-8B79-37D633B846F1}">
+                <asvg:svgBlip xmlns:asvg="http://schemas.microsoft.com/office/drawing/2016/SVG/main" r:embed="rId19"/>
+              </a:ext>
+            </a:extLst>
+          </a:blip>
+          <a:stretch>
+            <a:fillRect/>
+          </a:stretch>
+        </p:blipFill>
+        <p:spPr>
+          <a:xfrm>
+            <a:off x="1684859" y="5334482"/>
+            <a:ext cx="1260000" cy="1260000"/>
+          </a:xfrm>
+          <a:prstGeom prst="rect">
+            <a:avLst/>
+          </a:prstGeom>
+        </p:spPr>
+      </p:pic>
+      <p:pic>
+        <p:nvPicPr>
+          <p:cNvPr id="23" name="Graphic 22" descr="Compass with solid fill">
+            <a:extLst>
+              <a:ext uri="{FF2B5EF4-FFF2-40B4-BE49-F238E27FC236}">
+                <a16:creationId xmlns:a16="http://schemas.microsoft.com/office/drawing/2014/main" id="{34E280A9-C3D4-D96E-C779-33FD44ED28D7}"/>
+              </a:ext>
+            </a:extLst>
+          </p:cNvPr>
+          <p:cNvPicPr>
+            <a:picLocks noChangeAspect="1"/>
+          </p:cNvPicPr>
+          <p:nvPr/>
+        </p:nvPicPr>
+        <p:blipFill>
+          <a:blip r:embed="rId20">
+            <a:extLst>
+              <a:ext uri="{28A0092B-C50C-407E-A947-70E740481C1C}">
+                <a14:useLocalDpi xmlns:a14="http://schemas.microsoft.com/office/drawing/2010/main" val="0"/>
+              </a:ext>
+              <a:ext uri="{96DAC541-7B7A-43D3-8B79-37D633B846F1}">
+                <asvg:svgBlip xmlns:asvg="http://schemas.microsoft.com/office/drawing/2016/SVG/main" r:embed="rId21"/>
+              </a:ext>
+            </a:extLst>
+          </a:blip>
+          <a:stretch>
+            <a:fillRect/>
+          </a:stretch>
+        </p:blipFill>
+        <p:spPr>
+          <a:xfrm>
+            <a:off x="5740546" y="408872"/>
+            <a:ext cx="1260000" cy="1260000"/>
+          </a:xfrm>
+          <a:prstGeom prst="rect">
+            <a:avLst/>
+          </a:prstGeom>
+        </p:spPr>
+      </p:pic>
+      <p:pic>
+        <p:nvPicPr>
+          <p:cNvPr id="27" name="Graphic 26" descr="Watch with solid fill">
+            <a:extLst>
+              <a:ext uri="{FF2B5EF4-FFF2-40B4-BE49-F238E27FC236}">
+                <a16:creationId xmlns:a16="http://schemas.microsoft.com/office/drawing/2014/main" id="{F52080E1-A8B5-0E23-8144-C2965F58581F}"/>
+              </a:ext>
+            </a:extLst>
+          </p:cNvPr>
+          <p:cNvPicPr>
+            <a:picLocks noChangeAspect="1"/>
+          </p:cNvPicPr>
+          <p:nvPr/>
+        </p:nvPicPr>
+        <p:blipFill>
+          <a:blip r:embed="rId22">
+            <a:extLst>
+              <a:ext uri="{28A0092B-C50C-407E-A947-70E740481C1C}">
+                <a14:useLocalDpi xmlns:a14="http://schemas.microsoft.com/office/drawing/2010/main" val="0"/>
+              </a:ext>
+              <a:ext uri="{96DAC541-7B7A-43D3-8B79-37D633B846F1}">
+                <asvg:svgBlip xmlns:asvg="http://schemas.microsoft.com/office/drawing/2016/SVG/main" r:embed="rId23"/>
+              </a:ext>
+            </a:extLst>
+          </a:blip>
+          <a:stretch>
+            <a:fillRect/>
+          </a:stretch>
+        </p:blipFill>
+        <p:spPr>
+          <a:xfrm>
+            <a:off x="7104323" y="4630826"/>
+            <a:ext cx="1260000" cy="1260000"/>
+          </a:xfrm>
+          <a:prstGeom prst="rect">
+            <a:avLst/>
+          </a:prstGeom>
+        </p:spPr>
+      </p:pic>
+      <p:pic>
+        <p:nvPicPr>
+          <p:cNvPr id="29" name="Graphic 28" descr="Car with solid fill">
+            <a:extLst>
+              <a:ext uri="{FF2B5EF4-FFF2-40B4-BE49-F238E27FC236}">
+                <a16:creationId xmlns:a16="http://schemas.microsoft.com/office/drawing/2014/main" id="{5B9ACB3A-0D8B-1CA4-C3E4-D26323F81A52}"/>
+              </a:ext>
+            </a:extLst>
+          </p:cNvPr>
+          <p:cNvPicPr>
+            <a:picLocks noChangeAspect="1"/>
+          </p:cNvPicPr>
+          <p:nvPr/>
+        </p:nvPicPr>
+        <p:blipFill>
+          <a:blip r:embed="rId24">
+            <a:extLst>
+              <a:ext uri="{28A0092B-C50C-407E-A947-70E740481C1C}">
+                <a14:useLocalDpi xmlns:a14="http://schemas.microsoft.com/office/drawing/2010/main" val="0"/>
+              </a:ext>
+              <a:ext uri="{96DAC541-7B7A-43D3-8B79-37D633B846F1}">
+                <asvg:svgBlip xmlns:asvg="http://schemas.microsoft.com/office/drawing/2016/SVG/main" r:embed="rId25"/>
+              </a:ext>
+            </a:extLst>
+          </a:blip>
+          <a:stretch>
+            <a:fillRect/>
+          </a:stretch>
+        </p:blipFill>
+        <p:spPr>
+          <a:xfrm>
+            <a:off x="7243316" y="1112531"/>
+            <a:ext cx="1260000" cy="1260000"/>
+          </a:xfrm>
+          <a:prstGeom prst="rect">
+            <a:avLst/>
+          </a:prstGeom>
+        </p:spPr>
+      </p:pic>
+      <p:pic>
+        <p:nvPicPr>
+          <p:cNvPr id="31" name="Graphic 30" descr="Credit card with solid fill">
+            <a:extLst>
+              <a:ext uri="{FF2B5EF4-FFF2-40B4-BE49-F238E27FC236}">
+                <a16:creationId xmlns:a16="http://schemas.microsoft.com/office/drawing/2014/main" id="{D45804A0-7F5A-C4E9-B5AA-2DDA49614758}"/>
+              </a:ext>
+            </a:extLst>
+          </p:cNvPr>
+          <p:cNvPicPr>
+            <a:picLocks noChangeAspect="1"/>
+          </p:cNvPicPr>
+          <p:nvPr/>
+        </p:nvPicPr>
+        <p:blipFill>
+          <a:blip r:embed="rId26">
+            <a:extLst>
+              <a:ext uri="{28A0092B-C50C-407E-A947-70E740481C1C}">
+                <a14:useLocalDpi xmlns:a14="http://schemas.microsoft.com/office/drawing/2010/main" val="0"/>
+              </a:ext>
+              <a:ext uri="{96DAC541-7B7A-43D3-8B79-37D633B846F1}">
+                <asvg:svgBlip xmlns:asvg="http://schemas.microsoft.com/office/drawing/2016/SVG/main" r:embed="rId27"/>
+              </a:ext>
+            </a:extLst>
+          </a:blip>
+          <a:stretch>
+            <a:fillRect/>
+          </a:stretch>
+        </p:blipFill>
+        <p:spPr>
+          <a:xfrm>
+            <a:off x="7013183" y="3223508"/>
+            <a:ext cx="1260000" cy="1260000"/>
+          </a:xfrm>
+          <a:prstGeom prst="rect">
+            <a:avLst/>
+          </a:prstGeom>
+        </p:spPr>
+      </p:pic>
+      <p:pic>
+        <p:nvPicPr>
+          <p:cNvPr id="33" name="Graphic 32" descr="Work from home Wi-Fi with solid fill">
+            <a:extLst>
+              <a:ext uri="{FF2B5EF4-FFF2-40B4-BE49-F238E27FC236}">
+                <a16:creationId xmlns:a16="http://schemas.microsoft.com/office/drawing/2014/main" id="{22CB523C-9574-8E38-E886-440EE0A493C2}"/>
+              </a:ext>
+            </a:extLst>
+          </p:cNvPr>
+          <p:cNvPicPr>
+            <a:picLocks noChangeAspect="1"/>
+          </p:cNvPicPr>
+          <p:nvPr/>
+        </p:nvPicPr>
+        <p:blipFill>
+          <a:blip r:embed="rId28">
+            <a:extLst>
+              <a:ext uri="{28A0092B-C50C-407E-A947-70E740481C1C}">
+                <a14:useLocalDpi xmlns:a14="http://schemas.microsoft.com/office/drawing/2010/main" val="0"/>
+              </a:ext>
+              <a:ext uri="{96DAC541-7B7A-43D3-8B79-37D633B846F1}">
+                <asvg:svgBlip xmlns:asvg="http://schemas.microsoft.com/office/drawing/2016/SVG/main" r:embed="rId29"/>
+              </a:ext>
+            </a:extLst>
+          </a:blip>
+          <a:stretch>
+            <a:fillRect/>
+          </a:stretch>
+        </p:blipFill>
+        <p:spPr>
+          <a:xfrm>
+            <a:off x="2387295" y="2311958"/>
+            <a:ext cx="1260000" cy="1260000"/>
+          </a:xfrm>
+          <a:prstGeom prst="rect">
+            <a:avLst/>
+          </a:prstGeom>
+        </p:spPr>
+      </p:pic>
+      <p:pic>
+        <p:nvPicPr>
+          <p:cNvPr id="35" name="Graphic 34" descr="Online meeting with solid fill">
+            <a:extLst>
+              <a:ext uri="{FF2B5EF4-FFF2-40B4-BE49-F238E27FC236}">
+                <a16:creationId xmlns:a16="http://schemas.microsoft.com/office/drawing/2014/main" id="{AED8CE27-EFA5-D5AF-7761-6A3892890C5C}"/>
+              </a:ext>
+            </a:extLst>
+          </p:cNvPr>
+          <p:cNvPicPr>
+            <a:picLocks noChangeAspect="1"/>
+          </p:cNvPicPr>
+          <p:nvPr/>
+        </p:nvPicPr>
+        <p:blipFill>
+          <a:blip r:embed="rId30">
+            <a:extLst>
+              <a:ext uri="{28A0092B-C50C-407E-A947-70E740481C1C}">
+                <a14:useLocalDpi xmlns:a14="http://schemas.microsoft.com/office/drawing/2010/main" val="0"/>
+              </a:ext>
+              <a:ext uri="{96DAC541-7B7A-43D3-8B79-37D633B846F1}">
+                <asvg:svgBlip xmlns:asvg="http://schemas.microsoft.com/office/drawing/2016/SVG/main" r:embed="rId31"/>
+              </a:ext>
+            </a:extLst>
+          </a:blip>
+          <a:stretch>
+            <a:fillRect/>
+          </a:stretch>
+        </p:blipFill>
+        <p:spPr>
+          <a:xfrm>
+            <a:off x="274580" y="2519849"/>
+            <a:ext cx="1260000" cy="1260000"/>
+          </a:xfrm>
+          <a:prstGeom prst="rect">
+            <a:avLst/>
+          </a:prstGeom>
+        </p:spPr>
+      </p:pic>
+      <p:pic>
+        <p:nvPicPr>
+          <p:cNvPr id="37" name="Graphic 36" descr="Connections with solid fill">
+            <a:extLst>
+              <a:ext uri="{FF2B5EF4-FFF2-40B4-BE49-F238E27FC236}">
+                <a16:creationId xmlns:a16="http://schemas.microsoft.com/office/drawing/2014/main" id="{2D9152D3-3906-8FF1-44AF-2A167688D808}"/>
+              </a:ext>
+            </a:extLst>
+          </p:cNvPr>
+          <p:cNvPicPr>
+            <a:picLocks noChangeAspect="1"/>
+          </p:cNvPicPr>
+          <p:nvPr/>
+        </p:nvPicPr>
+        <p:blipFill>
+          <a:blip r:embed="rId32">
+            <a:extLst>
+              <a:ext uri="{28A0092B-C50C-407E-A947-70E740481C1C}">
+                <a14:useLocalDpi xmlns:a14="http://schemas.microsoft.com/office/drawing/2010/main" val="0"/>
+              </a:ext>
+              <a:ext uri="{96DAC541-7B7A-43D3-8B79-37D633B846F1}">
+                <asvg:svgBlip xmlns:asvg="http://schemas.microsoft.com/office/drawing/2016/SVG/main" r:embed="rId33"/>
+              </a:ext>
+            </a:extLst>
+          </a:blip>
+          <a:stretch>
+            <a:fillRect/>
+          </a:stretch>
+        </p:blipFill>
+        <p:spPr>
+          <a:xfrm>
+            <a:off x="5844323" y="4161720"/>
+            <a:ext cx="1260000" cy="1260000"/>
+          </a:xfrm>
+          <a:prstGeom prst="rect">
+            <a:avLst/>
+          </a:prstGeom>
+        </p:spPr>
+      </p:pic>
+      <p:pic>
+        <p:nvPicPr>
+          <p:cNvPr id="39" name="Graphic 38" descr="Fingerprint outline">
+            <a:extLst>
+              <a:ext uri="{FF2B5EF4-FFF2-40B4-BE49-F238E27FC236}">
+                <a16:creationId xmlns:a16="http://schemas.microsoft.com/office/drawing/2014/main" id="{35982AD6-A7D4-5848-7B57-609D4C5D31C2}"/>
+              </a:ext>
+            </a:extLst>
+          </p:cNvPr>
+          <p:cNvPicPr>
+            <a:picLocks noChangeAspect="1"/>
+          </p:cNvPicPr>
+          <p:nvPr/>
+        </p:nvPicPr>
+        <p:blipFill>
+          <a:blip r:embed="rId34">
+            <a:extLst>
+              <a:ext uri="{28A0092B-C50C-407E-A947-70E740481C1C}">
+                <a14:useLocalDpi xmlns:a14="http://schemas.microsoft.com/office/drawing/2010/main" val="0"/>
+              </a:ext>
+              <a:ext uri="{96DAC541-7B7A-43D3-8B79-37D633B846F1}">
+                <asvg:svgBlip xmlns:asvg="http://schemas.microsoft.com/office/drawing/2016/SVG/main" r:embed="rId35"/>
+              </a:ext>
+            </a:extLst>
+          </a:blip>
+          <a:stretch>
+            <a:fillRect/>
+          </a:stretch>
+        </p:blipFill>
+        <p:spPr>
+          <a:xfrm>
+            <a:off x="631031" y="4396273"/>
+            <a:ext cx="1260000" cy="1260000"/>
+          </a:xfrm>
+          <a:prstGeom prst="rect">
+            <a:avLst/>
+          </a:prstGeom>
+        </p:spPr>
+      </p:pic>
+      <p:pic>
+        <p:nvPicPr>
+          <p:cNvPr id="41" name="Graphic 40" descr="Inbox with solid fill">
+            <a:extLst>
+              <a:ext uri="{FF2B5EF4-FFF2-40B4-BE49-F238E27FC236}">
+                <a16:creationId xmlns:a16="http://schemas.microsoft.com/office/drawing/2014/main" id="{8B10A555-3CFB-6575-F669-D50811AD6A0B}"/>
+              </a:ext>
+            </a:extLst>
+          </p:cNvPr>
+          <p:cNvPicPr>
+            <a:picLocks noChangeAspect="1"/>
+          </p:cNvPicPr>
+          <p:nvPr/>
+        </p:nvPicPr>
+        <p:blipFill>
+          <a:blip r:embed="rId36">
+            <a:extLst>
+              <a:ext uri="{28A0092B-C50C-407E-A947-70E740481C1C}">
+                <a14:useLocalDpi xmlns:a14="http://schemas.microsoft.com/office/drawing/2010/main" val="0"/>
+              </a:ext>
+              <a:ext uri="{96DAC541-7B7A-43D3-8B79-37D633B846F1}">
+                <asvg:svgBlip xmlns:asvg="http://schemas.microsoft.com/office/drawing/2016/SVG/main" r:embed="rId37"/>
+              </a:ext>
+            </a:extLst>
+          </a:blip>
+          <a:stretch>
+            <a:fillRect/>
+          </a:stretch>
+        </p:blipFill>
+        <p:spPr>
+          <a:xfrm>
+            <a:off x="4402120" y="3788451"/>
+            <a:ext cx="1260000" cy="1260000"/>
+          </a:xfrm>
+          <a:prstGeom prst="rect">
+            <a:avLst/>
+          </a:prstGeom>
+        </p:spPr>
+      </p:pic>
+      <p:pic>
+        <p:nvPicPr>
+          <p:cNvPr id="43" name="Graphic 42" descr="Influencer with solid fill">
+            <a:extLst>
+              <a:ext uri="{FF2B5EF4-FFF2-40B4-BE49-F238E27FC236}">
+                <a16:creationId xmlns:a16="http://schemas.microsoft.com/office/drawing/2014/main" id="{01B11ADF-A4CA-5D2E-8F0F-74A26225C038}"/>
+              </a:ext>
+            </a:extLst>
+          </p:cNvPr>
+          <p:cNvPicPr>
+            <a:picLocks noChangeAspect="1"/>
+          </p:cNvPicPr>
+          <p:nvPr/>
+        </p:nvPicPr>
+        <p:blipFill>
+          <a:blip r:embed="rId38">
+            <a:extLst>
+              <a:ext uri="{28A0092B-C50C-407E-A947-70E740481C1C}">
+                <a14:useLocalDpi xmlns:a14="http://schemas.microsoft.com/office/drawing/2010/main" val="0"/>
+              </a:ext>
+              <a:ext uri="{96DAC541-7B7A-43D3-8B79-37D633B846F1}">
+                <asvg:svgBlip xmlns:asvg="http://schemas.microsoft.com/office/drawing/2016/SVG/main" r:embed="rId39"/>
+              </a:ext>
+            </a:extLst>
+          </a:blip>
+          <a:stretch>
+            <a:fillRect/>
+          </a:stretch>
+        </p:blipFill>
+        <p:spPr>
+          <a:xfrm>
+            <a:off x="1454901" y="1347084"/>
+            <a:ext cx="1260000" cy="1260000"/>
+          </a:xfrm>
+          <a:prstGeom prst="rect">
+            <a:avLst/>
+          </a:prstGeom>
+        </p:spPr>
+      </p:pic>
+      <p:pic>
+        <p:nvPicPr>
+          <p:cNvPr id="45" name="Graphic 44" descr="Internet Of Things with solid fill">
+            <a:extLst>
+              <a:ext uri="{FF2B5EF4-FFF2-40B4-BE49-F238E27FC236}">
+                <a16:creationId xmlns:a16="http://schemas.microsoft.com/office/drawing/2014/main" id="{6C44137F-556A-6D90-AD51-B31693F77D41}"/>
+              </a:ext>
+            </a:extLst>
+          </p:cNvPr>
+          <p:cNvPicPr>
+            <a:picLocks noChangeAspect="1"/>
+          </p:cNvPicPr>
+          <p:nvPr/>
+        </p:nvPicPr>
+        <p:blipFill>
+          <a:blip r:embed="rId40">
+            <a:extLst>
+              <a:ext uri="{28A0092B-C50C-407E-A947-70E740481C1C}">
+                <a14:useLocalDpi xmlns:a14="http://schemas.microsoft.com/office/drawing/2010/main" val="0"/>
+              </a:ext>
+              <a:ext uri="{96DAC541-7B7A-43D3-8B79-37D633B846F1}">
+                <asvg:svgBlip xmlns:asvg="http://schemas.microsoft.com/office/drawing/2016/SVG/main" r:embed="rId41"/>
+              </a:ext>
+            </a:extLst>
+          </a:blip>
+          <a:stretch>
+            <a:fillRect/>
+          </a:stretch>
+        </p:blipFill>
+        <p:spPr>
+          <a:xfrm>
+            <a:off x="1435558" y="3458061"/>
+            <a:ext cx="1260000" cy="1260000"/>
+          </a:xfrm>
+          <a:prstGeom prst="rect">
+            <a:avLst/>
+          </a:prstGeom>
+        </p:spPr>
+      </p:pic>
+      <p:pic>
+        <p:nvPicPr>
+          <p:cNvPr id="47" name="Graphic 46" descr="Laptop with solid fill">
+            <a:extLst>
+              <a:ext uri="{FF2B5EF4-FFF2-40B4-BE49-F238E27FC236}">
+                <a16:creationId xmlns:a16="http://schemas.microsoft.com/office/drawing/2014/main" id="{4DE1CDFD-AA0C-95A4-AFF8-2BF7431BD792}"/>
+              </a:ext>
+            </a:extLst>
+          </p:cNvPr>
+          <p:cNvPicPr>
+            <a:picLocks noChangeAspect="1"/>
+          </p:cNvPicPr>
+          <p:nvPr/>
+        </p:nvPicPr>
+        <p:blipFill>
+          <a:blip r:embed="rId42">
+            <a:extLst>
+              <a:ext uri="{28A0092B-C50C-407E-A947-70E740481C1C}">
+                <a14:useLocalDpi xmlns:a14="http://schemas.microsoft.com/office/drawing/2010/main" val="0"/>
+              </a:ext>
+              <a:ext uri="{96DAC541-7B7A-43D3-8B79-37D633B846F1}">
+                <asvg:svgBlip xmlns:asvg="http://schemas.microsoft.com/office/drawing/2016/SVG/main" r:embed="rId43"/>
+              </a:ext>
+            </a:extLst>
+          </a:blip>
+          <a:stretch>
+            <a:fillRect/>
+          </a:stretch>
+        </p:blipFill>
+        <p:spPr>
+          <a:xfrm>
+            <a:off x="3215777" y="5099932"/>
+            <a:ext cx="1260000" cy="1260000"/>
+          </a:xfrm>
+          <a:prstGeom prst="rect">
+            <a:avLst/>
+          </a:prstGeom>
+        </p:spPr>
+      </p:pic>
+      <p:pic>
+        <p:nvPicPr>
+          <p:cNvPr id="51" name="Graphic 50" descr="Meeting with solid fill">
+            <a:extLst>
+              <a:ext uri="{FF2B5EF4-FFF2-40B4-BE49-F238E27FC236}">
+                <a16:creationId xmlns:a16="http://schemas.microsoft.com/office/drawing/2014/main" id="{A1B3CDD8-B9F8-E9FE-E93E-46F4D9C243C3}"/>
+              </a:ext>
+            </a:extLst>
+          </p:cNvPr>
+          <p:cNvPicPr>
+            <a:picLocks noChangeAspect="1"/>
+          </p:cNvPicPr>
+          <p:nvPr/>
+        </p:nvPicPr>
+        <p:blipFill>
+          <a:blip r:embed="rId44">
+            <a:extLst>
+              <a:ext uri="{28A0092B-C50C-407E-A947-70E740481C1C}">
+                <a14:useLocalDpi xmlns:a14="http://schemas.microsoft.com/office/drawing/2010/main" val="0"/>
+              </a:ext>
+              <a:ext uri="{96DAC541-7B7A-43D3-8B79-37D633B846F1}">
+                <asvg:svgBlip xmlns:asvg="http://schemas.microsoft.com/office/drawing/2016/SVG/main" r:embed="rId45"/>
+              </a:ext>
+            </a:extLst>
+          </a:blip>
+          <a:stretch>
+            <a:fillRect/>
+          </a:stretch>
+        </p:blipFill>
+        <p:spPr>
+          <a:xfrm>
+            <a:off x="5659279" y="1581637"/>
+            <a:ext cx="1260000" cy="1260000"/>
+          </a:xfrm>
+          <a:prstGeom prst="rect">
+            <a:avLst/>
+          </a:prstGeom>
+        </p:spPr>
+      </p:pic>
+      <p:pic>
+        <p:nvPicPr>
+          <p:cNvPr id="53" name="Graphic 52" descr="Monitor with solid fill">
+            <a:extLst>
+              <a:ext uri="{FF2B5EF4-FFF2-40B4-BE49-F238E27FC236}">
+                <a16:creationId xmlns:a16="http://schemas.microsoft.com/office/drawing/2014/main" id="{1CED1216-F781-CCA7-62E0-80D7D9FAD777}"/>
+              </a:ext>
+            </a:extLst>
+          </p:cNvPr>
+          <p:cNvPicPr>
+            <a:picLocks noChangeAspect="1"/>
+          </p:cNvPicPr>
+          <p:nvPr/>
+        </p:nvPicPr>
+        <p:blipFill>
+          <a:blip r:embed="rId46">
+            <a:extLst>
+              <a:ext uri="{28A0092B-C50C-407E-A947-70E740481C1C}">
+                <a14:useLocalDpi xmlns:a14="http://schemas.microsoft.com/office/drawing/2010/main" val="0"/>
+              </a:ext>
+              <a:ext uri="{96DAC541-7B7A-43D3-8B79-37D633B846F1}">
+                <asvg:svgBlip xmlns:asvg="http://schemas.microsoft.com/office/drawing/2016/SVG/main" r:embed="rId47"/>
+              </a:ext>
+            </a:extLst>
+          </a:blip>
+          <a:stretch>
+            <a:fillRect/>
+          </a:stretch>
+        </p:blipFill>
+        <p:spPr>
+          <a:xfrm>
+            <a:off x="7081812" y="2050743"/>
+            <a:ext cx="1260000" cy="1260000"/>
+          </a:xfrm>
+          <a:prstGeom prst="rect">
+            <a:avLst/>
+          </a:prstGeom>
+        </p:spPr>
+      </p:pic>
+    </p:spTree>
+    <p:extLst>
+      <p:ext uri="{BB962C8B-B14F-4D97-AF65-F5344CB8AC3E}">
         <p14:creationId xmlns:p14="http://schemas.microsoft.com/office/powerpoint/2010/main" val="3425902942"/>
       </p:ext>
     </p:extLst>
@@ -5738,7 +6377,7 @@
 </p:sld>
 </file>
 
-<file path=ppt/slides/slide4.xml><?xml version="1.0" encoding="utf-8"?>
+<file path=ppt/slides/slide5.xml><?xml version="1.0" encoding="utf-8"?>
 <p:sld xmlns:a="http://schemas.openxmlformats.org/drawingml/2006/main" xmlns:r="http://schemas.openxmlformats.org/officeDocument/2006/relationships" xmlns:p="http://schemas.openxmlformats.org/presentationml/2006/main">
   <p:cSld>
     <p:spTree>

</xml_diff>